<commit_message>
Added the black powerpoint template to MDID
</commit_message>
<xml_diff>
--- a/rooibos/pptexport/pptx_templates/black.pptx
+++ b/rooibos/pptexport/pptx_templates/black.pptx
@@ -2,7 +2,7 @@
 <file path=ppt/presentation.xml><?xml version="1.0" encoding="utf-8"?>
 <p:presentation xmlns:a="http://schemas.openxmlformats.org/drawingml/2006/main" xmlns:r="http://schemas.openxmlformats.org/officeDocument/2006/relationships" xmlns:p="http://schemas.openxmlformats.org/presentationml/2006/main" saveSubsetFonts="1">
   <p:sldMasterIdLst>
-    <p:sldMasterId id="2147483660" r:id="rId1"/>
+    <p:sldMasterId id="2147483672" r:id="rId1"/>
   </p:sldMasterIdLst>
   <p:notesMasterIdLst>
     <p:notesMasterId r:id="rId4"/>
@@ -194,7 +194,7 @@
             <a:fld id="{EE5FAB97-B9C8-4BA1-A651-0726CD11835C}" type="datetimeFigureOut">
               <a:rPr lang="en-US" smtClean="0"/>
               <a:pPr/>
-              <a:t>10/21/2009</a:t>
+              <a:t>13/10/15</a:t>
             </a:fld>
             <a:endParaRPr lang="en-US"/>
           </a:p>
@@ -363,6 +363,11 @@
         </p:txBody>
       </p:sp>
     </p:spTree>
+    <p:extLst>
+      <p:ext uri="{BB962C8B-B14F-4D97-AF65-F5344CB8AC3E}">
+        <p14:creationId xmlns:p14="http://schemas.microsoft.com/office/powerpoint/2010/main" val="2948759920"/>
+      </p:ext>
+    </p:extLst>
   </p:cSld>
   <p:clrMap bg1="lt1" tx1="dk1" bg2="lt2" tx2="dk2" accent1="accent1" accent2="accent2" accent3="accent3" accent4="accent4" accent5="accent5" accent6="accent6" hlink="hlink" folHlink="folHlink"/>
   <p:notesStyle>
@@ -625,13 +630,8 @@
 </file>
 
 <file path=ppt/slideLayouts/slideLayout1.xml><?xml version="1.0" encoding="utf-8"?>
-<p:sldLayout xmlns:a="http://schemas.openxmlformats.org/drawingml/2006/main" xmlns:r="http://schemas.openxmlformats.org/officeDocument/2006/relationships" xmlns:p="http://schemas.openxmlformats.org/presentationml/2006/main" showMasterSp="0" type="title" preserve="1">
+<p:sldLayout xmlns:a="http://schemas.openxmlformats.org/drawingml/2006/main" xmlns:r="http://schemas.openxmlformats.org/officeDocument/2006/relationships" xmlns:p="http://schemas.openxmlformats.org/presentationml/2006/main" type="title" preserve="1">
   <p:cSld name="Title Slide">
-    <p:bg>
-      <p:bgRef idx="1002">
-        <a:schemeClr val="bg2"/>
-      </p:bgRef>
-    </p:bg>
     <p:spTree>
       <p:nvGrpSpPr>
         <p:cNvPr id="1" name=""/>
@@ -648,54 +648,7 @@
       </p:grpSpPr>
       <p:sp>
         <p:nvSpPr>
-          <p:cNvPr id="9" name="Rectangle 8"/>
-          <p:cNvSpPr/>
-          <p:nvPr/>
-        </p:nvSpPr>
-        <p:spPr bwMode="ltGray">
-          <a:xfrm>
-            <a:off x="0" y="0"/>
-            <a:ext cx="9143999" cy="5135430"/>
-          </a:xfrm>
-          <a:prstGeom prst="rect">
-            <a:avLst/>
-          </a:prstGeom>
-          <a:solidFill>
-            <a:srgbClr val="000000"/>
-          </a:solidFill>
-          <a:ln w="48000" cap="flat" cmpd="thickThin" algn="ctr">
-            <a:noFill/>
-            <a:prstDash val="solid"/>
-          </a:ln>
-        </p:spPr>
-        <p:style>
-          <a:lnRef idx="2">
-            <a:schemeClr val="accent1"/>
-          </a:lnRef>
-          <a:fillRef idx="1">
-            <a:schemeClr val="accent1"/>
-          </a:fillRef>
-          <a:effectRef idx="0">
-            <a:schemeClr val="accent1"/>
-          </a:effectRef>
-          <a:fontRef idx="minor">
-            <a:schemeClr val="lt1"/>
-          </a:fontRef>
-        </p:style>
-        <p:txBody>
-          <a:bodyPr rtlCol="0" anchor="ctr"/>
-          <a:lstStyle>
-            <a:extLst/>
-          </a:lstStyle>
-          <a:p>
-            <a:pPr algn="ctr" eaLnBrk="1" latinLnBrk="0" hangingPunct="1"/>
-            <a:endParaRPr kumimoji="0" lang="en-US"/>
-          </a:p>
-        </p:txBody>
-      </p:sp>
-      <p:sp>
-        <p:nvSpPr>
-          <p:cNvPr id="2" name="Title 1"/>
+          <p:cNvPr id="8" name="Title 7"/>
           <p:cNvSpPr>
             <a:spLocks noGrp="1"/>
           </p:cNvSpPr>
@@ -705,28 +658,61 @@
         </p:nvSpPr>
         <p:spPr>
           <a:xfrm>
-            <a:off x="685800" y="3355848"/>
-            <a:ext cx="8077200" cy="1673352"/>
+            <a:off x="422030" y="1371600"/>
+            <a:ext cx="8229600" cy="1828800"/>
           </a:xfrm>
         </p:spPr>
         <p:txBody>
-          <a:bodyPr vert="horz" lIns="91440" tIns="0" rIns="45720" bIns="0" rtlCol="0" anchor="t">
+          <a:bodyPr vert="horz" lIns="45720" tIns="0" rIns="45720" bIns="0" anchor="b">
             <a:normAutofit/>
             <a:scene3d>
               <a:camera prst="orthographicFront"/>
-              <a:lightRig rig="threePt" dir="t">
-                <a:rot lat="0" lon="0" rev="4800000"/>
+              <a:lightRig rig="soft" dir="t">
+                <a:rot lat="0" lon="0" rev="17220000"/>
               </a:lightRig>
             </a:scene3d>
-            <a:sp3d prstMaterial="matte">
-              <a:bevelT w="50800" h="10160"/>
+            <a:sp3d prstMaterial="softEdge">
+              <a:bevelT w="38100" h="38100"/>
             </a:sp3d>
           </a:bodyPr>
           <a:lstStyle>
-            <a:lvl1pPr algn="l">
-              <a:defRPr sz="4700" b="1"/>
+            <a:lvl1pPr>
+              <a:defRPr sz="4800" b="1" cap="all" baseline="0">
+                <a:ln w="6350">
+                  <a:noFill/>
+                </a:ln>
+                <a:gradFill>
+                  <a:gsLst>
+                    <a:gs pos="0">
+                      <a:schemeClr val="accent1">
+                        <a:tint val="73000"/>
+                        <a:satMod val="145000"/>
+                      </a:schemeClr>
+                    </a:gs>
+                    <a:gs pos="73000">
+                      <a:schemeClr val="accent1">
+                        <a:tint val="73000"/>
+                        <a:satMod val="145000"/>
+                      </a:schemeClr>
+                    </a:gs>
+                    <a:gs pos="100000">
+                      <a:schemeClr val="accent1">
+                        <a:tint val="83000"/>
+                        <a:satMod val="143000"/>
+                      </a:schemeClr>
+                    </a:gs>
+                  </a:gsLst>
+                  <a:lin ang="4800000" scaled="1"/>
+                </a:gradFill>
+                <a:effectLst>
+                  <a:outerShdw blurRad="127000" dist="200000" dir="2700000" algn="tl" rotWithShape="0">
+                    <a:srgbClr val="000000">
+                      <a:alpha val="30000"/>
+                    </a:srgbClr>
+                  </a:outerShdw>
+                </a:effectLst>
+              </a:defRPr>
             </a:lvl1pPr>
-            <a:extLst/>
           </a:lstStyle>
           <a:p>
             <a:r>
@@ -739,7 +725,74 @@
       </p:sp>
       <p:sp>
         <p:nvSpPr>
-          <p:cNvPr id="3" name="Subtitle 2"/>
+          <p:cNvPr id="28" name="Date Placeholder 27"/>
+          <p:cNvSpPr>
+            <a:spLocks noGrp="1"/>
+          </p:cNvSpPr>
+          <p:nvPr>
+            <p:ph type="dt" sz="half" idx="10"/>
+          </p:nvPr>
+        </p:nvSpPr>
+        <p:spPr/>
+        <p:txBody>
+          <a:bodyPr/>
+          <a:lstStyle/>
+          <a:p>
+            <a:fld id="{2E894346-B744-48A0-AB61-643E2864BD5B}" type="datetimeFigureOut">
+              <a:rPr lang="en-US" smtClean="0"/>
+              <a:pPr/>
+              <a:t>13/10/15</a:t>
+            </a:fld>
+            <a:endParaRPr lang="en-US"/>
+          </a:p>
+        </p:txBody>
+      </p:sp>
+      <p:sp>
+        <p:nvSpPr>
+          <p:cNvPr id="17" name="Footer Placeholder 16"/>
+          <p:cNvSpPr>
+            <a:spLocks noGrp="1"/>
+          </p:cNvSpPr>
+          <p:nvPr>
+            <p:ph type="ftr" sz="quarter" idx="11"/>
+          </p:nvPr>
+        </p:nvSpPr>
+        <p:spPr/>
+        <p:txBody>
+          <a:bodyPr/>
+          <a:lstStyle/>
+          <a:p>
+            <a:endParaRPr lang="en-US"/>
+          </a:p>
+        </p:txBody>
+      </p:sp>
+      <p:sp>
+        <p:nvSpPr>
+          <p:cNvPr id="29" name="Slide Number Placeholder 28"/>
+          <p:cNvSpPr>
+            <a:spLocks noGrp="1"/>
+          </p:cNvSpPr>
+          <p:nvPr>
+            <p:ph type="sldNum" sz="quarter" idx="12"/>
+          </p:nvPr>
+        </p:nvSpPr>
+        <p:spPr/>
+        <p:txBody>
+          <a:bodyPr/>
+          <a:lstStyle/>
+          <a:p>
+            <a:fld id="{E20792DC-04E7-413D-B463-DF2B337F2D3F}" type="slidenum">
+              <a:rPr lang="en-US" smtClean="0"/>
+              <a:pPr/>
+              <a:t>‹#›</a:t>
+            </a:fld>
+            <a:endParaRPr lang="en-US"/>
+          </a:p>
+        </p:txBody>
+      </p:sp>
+      <p:sp>
+        <p:nvSpPr>
+          <p:cNvPr id="9" name="Subtitle 8"/>
           <p:cNvSpPr>
             <a:spLocks noGrp="1"/>
           </p:cNvSpPr>
@@ -749,229 +802,51 @@
         </p:nvSpPr>
         <p:spPr>
           <a:xfrm>
-            <a:off x="685800" y="1828800"/>
-            <a:ext cx="8077200" cy="1499616"/>
+            <a:off x="1371600" y="3331698"/>
+            <a:ext cx="6400800" cy="1752600"/>
           </a:xfrm>
         </p:spPr>
         <p:txBody>
-          <a:bodyPr lIns="118872" tIns="0" rIns="45720" bIns="0" anchor="b"/>
+          <a:bodyPr/>
           <a:lstStyle>
-            <a:lvl1pPr marL="0" indent="0" algn="l">
+            <a:lvl1pPr marL="0" indent="0" algn="ctr">
               <a:buNone/>
-              <a:defRPr sz="2000">
+              <a:defRPr>
                 <a:solidFill>
-                  <a:srgbClr val="FFFFFF"/>
+                  <a:schemeClr val="tx1"/>
                 </a:solidFill>
               </a:defRPr>
             </a:lvl1pPr>
             <a:lvl2pPr marL="457200" indent="0" algn="ctr">
               <a:buNone/>
-              <a:defRPr>
-                <a:solidFill>
-                  <a:schemeClr val="tx1">
-                    <a:tint val="75000"/>
-                  </a:schemeClr>
-                </a:solidFill>
-              </a:defRPr>
             </a:lvl2pPr>
             <a:lvl3pPr marL="914400" indent="0" algn="ctr">
               <a:buNone/>
-              <a:defRPr>
-                <a:solidFill>
-                  <a:schemeClr val="tx1">
-                    <a:tint val="75000"/>
-                  </a:schemeClr>
-                </a:solidFill>
-              </a:defRPr>
             </a:lvl3pPr>
             <a:lvl4pPr marL="1371600" indent="0" algn="ctr">
               <a:buNone/>
-              <a:defRPr>
-                <a:solidFill>
-                  <a:schemeClr val="tx1">
-                    <a:tint val="75000"/>
-                  </a:schemeClr>
-                </a:solidFill>
-              </a:defRPr>
             </a:lvl4pPr>
             <a:lvl5pPr marL="1828800" indent="0" algn="ctr">
               <a:buNone/>
-              <a:defRPr>
-                <a:solidFill>
-                  <a:schemeClr val="tx1">
-                    <a:tint val="75000"/>
-                  </a:schemeClr>
-                </a:solidFill>
-              </a:defRPr>
             </a:lvl5pPr>
             <a:lvl6pPr marL="2286000" indent="0" algn="ctr">
               <a:buNone/>
-              <a:defRPr>
-                <a:solidFill>
-                  <a:schemeClr val="tx1">
-                    <a:tint val="75000"/>
-                  </a:schemeClr>
-                </a:solidFill>
-              </a:defRPr>
             </a:lvl6pPr>
             <a:lvl7pPr marL="2743200" indent="0" algn="ctr">
               <a:buNone/>
-              <a:defRPr>
-                <a:solidFill>
-                  <a:schemeClr val="tx1">
-                    <a:tint val="75000"/>
-                  </a:schemeClr>
-                </a:solidFill>
-              </a:defRPr>
             </a:lvl7pPr>
             <a:lvl8pPr marL="3200400" indent="0" algn="ctr">
               <a:buNone/>
-              <a:defRPr>
-                <a:solidFill>
-                  <a:schemeClr val="tx1">
-                    <a:tint val="75000"/>
-                  </a:schemeClr>
-                </a:solidFill>
-              </a:defRPr>
             </a:lvl8pPr>
             <a:lvl9pPr marL="3657600" indent="0" algn="ctr">
               <a:buNone/>
-              <a:defRPr>
-                <a:solidFill>
-                  <a:schemeClr val="tx1">
-                    <a:tint val="75000"/>
-                  </a:schemeClr>
-                </a:solidFill>
-              </a:defRPr>
             </a:lvl9pPr>
-            <a:extLst/>
           </a:lstStyle>
           <a:p>
             <a:r>
               <a:rPr kumimoji="0" lang="en-US" smtClean="0"/>
               <a:t>Click to edit Master subtitle style</a:t>
             </a:r>
-            <a:endParaRPr kumimoji="0" lang="en-US"/>
-          </a:p>
-        </p:txBody>
-      </p:sp>
-      <p:sp>
-        <p:nvSpPr>
-          <p:cNvPr id="4" name="Date Placeholder 3"/>
-          <p:cNvSpPr>
-            <a:spLocks noGrp="1"/>
-          </p:cNvSpPr>
-          <p:nvPr>
-            <p:ph type="dt" sz="half" idx="10"/>
-          </p:nvPr>
-        </p:nvSpPr>
-        <p:spPr/>
-        <p:txBody>
-          <a:bodyPr/>
-          <a:lstStyle/>
-          <a:p>
-            <a:fld id="{2E894346-B744-48A0-AB61-643E2864BD5B}" type="datetimeFigureOut">
-              <a:rPr lang="en-US" smtClean="0"/>
-              <a:pPr/>
-              <a:t>10/21/2009</a:t>
-            </a:fld>
-            <a:endParaRPr lang="en-US"/>
-          </a:p>
-        </p:txBody>
-      </p:sp>
-      <p:sp>
-        <p:nvSpPr>
-          <p:cNvPr id="5" name="Footer Placeholder 4"/>
-          <p:cNvSpPr>
-            <a:spLocks noGrp="1"/>
-          </p:cNvSpPr>
-          <p:nvPr>
-            <p:ph type="ftr" sz="quarter" idx="11"/>
-          </p:nvPr>
-        </p:nvSpPr>
-        <p:spPr/>
-        <p:txBody>
-          <a:bodyPr/>
-          <a:lstStyle/>
-          <a:p>
-            <a:endParaRPr lang="en-US"/>
-          </a:p>
-        </p:txBody>
-      </p:sp>
-      <p:sp>
-        <p:nvSpPr>
-          <p:cNvPr id="6" name="Slide Number Placeholder 5"/>
-          <p:cNvSpPr>
-            <a:spLocks noGrp="1"/>
-          </p:cNvSpPr>
-          <p:nvPr>
-            <p:ph type="sldNum" sz="quarter" idx="12"/>
-          </p:nvPr>
-        </p:nvSpPr>
-        <p:spPr/>
-        <p:txBody>
-          <a:bodyPr/>
-          <a:lstStyle/>
-          <a:p>
-            <a:fld id="{E20792DC-04E7-413D-B463-DF2B337F2D3F}" type="slidenum">
-              <a:rPr lang="en-US" smtClean="0"/>
-              <a:pPr/>
-              <a:t>‹#›</a:t>
-            </a:fld>
-            <a:endParaRPr lang="en-US"/>
-          </a:p>
-        </p:txBody>
-      </p:sp>
-      <p:sp>
-        <p:nvSpPr>
-          <p:cNvPr id="10" name="Rectangle 9"/>
-          <p:cNvSpPr/>
-          <p:nvPr/>
-        </p:nvSpPr>
-        <p:spPr bwMode="invGray">
-          <a:xfrm>
-            <a:off x="0" y="5128334"/>
-            <a:ext cx="9144000" cy="45720"/>
-          </a:xfrm>
-          <a:prstGeom prst="rect">
-            <a:avLst/>
-          </a:prstGeom>
-          <a:solidFill>
-            <a:srgbClr val="FFFFFF"/>
-          </a:solidFill>
-          <a:ln w="48000" cap="flat" cmpd="thickThin" algn="ctr">
-            <a:noFill/>
-            <a:prstDash val="solid"/>
-          </a:ln>
-          <a:effectLst>
-            <a:outerShdw blurRad="31750" dist="10160" dir="5400000" algn="tl" rotWithShape="0">
-              <a:srgbClr val="000000">
-                <a:alpha val="60000"/>
-              </a:srgbClr>
-            </a:outerShdw>
-          </a:effectLst>
-        </p:spPr>
-        <p:style>
-          <a:lnRef idx="2">
-            <a:schemeClr val="accent1"/>
-          </a:lnRef>
-          <a:fillRef idx="1">
-            <a:schemeClr val="accent1"/>
-          </a:fillRef>
-          <a:effectRef idx="0">
-            <a:schemeClr val="accent1"/>
-          </a:effectRef>
-          <a:fontRef idx="minor">
-            <a:schemeClr val="lt1"/>
-          </a:fontRef>
-        </p:style>
-        <p:txBody>
-          <a:bodyPr rtlCol="0" anchor="ctr"/>
-          <a:lstStyle>
-            <a:extLst/>
-          </a:lstStyle>
-          <a:p>
-            <a:pPr algn="ctr" eaLnBrk="1" latinLnBrk="0" hangingPunct="1"/>
             <a:endParaRPr kumimoji="0" lang="en-US"/>
           </a:p>
         </p:txBody>
@@ -979,7 +854,7 @@
     </p:spTree>
   </p:cSld>
   <p:clrMapOvr>
-    <a:overrideClrMapping bg1="dk1" tx1="lt1" bg2="dk2" tx2="lt2" accent1="accent1" accent2="accent2" accent3="accent3" accent4="accent4" accent5="accent5" accent6="accent6" hlink="hlink" folHlink="folHlink"/>
+    <a:masterClrMapping/>
   </p:clrMapOvr>
 </p:sldLayout>
 </file>
@@ -1014,9 +889,7 @@
         <p:spPr/>
         <p:txBody>
           <a:bodyPr/>
-          <a:lstStyle>
-            <a:extLst/>
-          </a:lstStyle>
+          <a:lstStyle/>
           <a:p>
             <a:r>
               <a:rPr kumimoji="0" lang="en-US" smtClean="0"/>
@@ -1039,9 +912,7 @@
         <p:spPr/>
         <p:txBody>
           <a:bodyPr vert="eaVert"/>
-          <a:lstStyle>
-            <a:extLst/>
-          </a:lstStyle>
+          <a:lstStyle/>
           <a:p>
             <a:pPr lvl="0" eaLnBrk="1" latinLnBrk="0" hangingPunct="1"/>
             <a:r>
@@ -1098,7 +969,7 @@
             <a:fld id="{2E894346-B744-48A0-AB61-643E2864BD5B}" type="datetimeFigureOut">
               <a:rPr lang="en-US" smtClean="0"/>
               <a:pPr/>
-              <a:t>10/21/2009</a:t>
+              <a:t>13/10/15</a:t>
             </a:fld>
             <a:endParaRPr lang="en-US"/>
           </a:p>
@@ -1156,7 +1027,7 @@
 </file>
 
 <file path=ppt/slideLayouts/slideLayout11.xml><?xml version="1.0" encoding="utf-8"?>
-<p:sldLayout xmlns:a="http://schemas.openxmlformats.org/drawingml/2006/main" xmlns:r="http://schemas.openxmlformats.org/officeDocument/2006/relationships" xmlns:p="http://schemas.openxmlformats.org/presentationml/2006/main" showMasterSp="0" type="vertTitleAndTx" preserve="1">
+<p:sldLayout xmlns:a="http://schemas.openxmlformats.org/drawingml/2006/main" xmlns:r="http://schemas.openxmlformats.org/officeDocument/2006/relationships" xmlns:p="http://schemas.openxmlformats.org/presentationml/2006/main" type="vertTitleAndTx" preserve="1">
   <p:cSld name="Vertical Title and Text">
     <p:spTree>
       <p:nvGrpSpPr>
@@ -1174,107 +1045,6 @@
       </p:grpSpPr>
       <p:sp>
         <p:nvSpPr>
-          <p:cNvPr id="9" name="Rectangle 8"/>
-          <p:cNvSpPr/>
-          <p:nvPr/>
-        </p:nvSpPr>
-        <p:spPr bwMode="invGray">
-          <a:xfrm>
-            <a:off x="6598920" y="0"/>
-            <a:ext cx="45720" cy="6858000"/>
-          </a:xfrm>
-          <a:prstGeom prst="rect">
-            <a:avLst/>
-          </a:prstGeom>
-          <a:solidFill>
-            <a:srgbClr val="FFFFFF"/>
-          </a:solidFill>
-          <a:ln w="48000" cap="flat" cmpd="thickThin" algn="ctr">
-            <a:noFill/>
-            <a:prstDash val="solid"/>
-          </a:ln>
-          <a:effectLst>
-            <a:outerShdw blurRad="31750" dist="10160" dir="10800000" algn="tl" rotWithShape="0">
-              <a:srgbClr val="000000">
-                <a:alpha val="60000"/>
-              </a:srgbClr>
-            </a:outerShdw>
-          </a:effectLst>
-        </p:spPr>
-        <p:style>
-          <a:lnRef idx="2">
-            <a:schemeClr val="accent1"/>
-          </a:lnRef>
-          <a:fillRef idx="1">
-            <a:schemeClr val="accent1"/>
-          </a:fillRef>
-          <a:effectRef idx="0">
-            <a:schemeClr val="accent1"/>
-          </a:effectRef>
-          <a:fontRef idx="minor">
-            <a:schemeClr val="lt1"/>
-          </a:fontRef>
-        </p:style>
-        <p:txBody>
-          <a:bodyPr rtlCol="0" anchor="ctr"/>
-          <a:lstStyle>
-            <a:extLst/>
-          </a:lstStyle>
-          <a:p>
-            <a:pPr algn="ctr" eaLnBrk="1" latinLnBrk="0" hangingPunct="1"/>
-            <a:endParaRPr kumimoji="0" lang="en-US"/>
-          </a:p>
-        </p:txBody>
-      </p:sp>
-      <p:sp>
-        <p:nvSpPr>
-          <p:cNvPr id="8" name="Rectangle 7"/>
-          <p:cNvSpPr/>
-          <p:nvPr/>
-        </p:nvSpPr>
-        <p:spPr bwMode="ltGray">
-          <a:xfrm>
-            <a:off x="6647687" y="0"/>
-            <a:ext cx="2514601" cy="6858000"/>
-          </a:xfrm>
-          <a:prstGeom prst="rect">
-            <a:avLst/>
-          </a:prstGeom>
-          <a:solidFill>
-            <a:srgbClr val="000000"/>
-          </a:solidFill>
-          <a:ln w="48000" cap="flat" cmpd="thickThin" algn="ctr">
-            <a:noFill/>
-            <a:prstDash val="solid"/>
-          </a:ln>
-        </p:spPr>
-        <p:style>
-          <a:lnRef idx="2">
-            <a:schemeClr val="accent1"/>
-          </a:lnRef>
-          <a:fillRef idx="1">
-            <a:schemeClr val="accent1"/>
-          </a:fillRef>
-          <a:effectRef idx="0">
-            <a:schemeClr val="accent1"/>
-          </a:effectRef>
-          <a:fontRef idx="minor">
-            <a:schemeClr val="lt1"/>
-          </a:fontRef>
-        </p:style>
-        <p:txBody>
-          <a:bodyPr rtlCol="0" anchor="ctr"/>
-          <a:lstStyle>
-            <a:extLst/>
-          </a:lstStyle>
-          <a:p>
-            <a:pPr algn="ctr" eaLnBrk="1" latinLnBrk="0" hangingPunct="1"/>
-            <a:endParaRPr kumimoji="0" lang="en-US"/>
-          </a:p>
-        </p:txBody>
-      </p:sp>
-      <p:sp>
-        <p:nvSpPr>
           <p:cNvPr id="2" name="Vertical Title 1"/>
           <p:cNvSpPr>
             <a:spLocks noGrp="1"/>
@@ -1285,15 +1055,13 @@
         </p:nvSpPr>
         <p:spPr>
           <a:xfrm>
-            <a:off x="6781800" y="274640"/>
-            <a:ext cx="1905000" cy="5851525"/>
+            <a:off x="6629400" y="274638"/>
+            <a:ext cx="2057400" cy="5851525"/>
           </a:xfrm>
         </p:spPr>
         <p:txBody>
           <a:bodyPr vert="eaVert"/>
-          <a:lstStyle>
-            <a:extLst/>
-          </a:lstStyle>
+          <a:lstStyle/>
           <a:p>
             <a:r>
               <a:rPr kumimoji="0" lang="en-US" smtClean="0"/>
@@ -1315,15 +1083,13 @@
         </p:nvSpPr>
         <p:spPr>
           <a:xfrm>
-            <a:off x="457200" y="304800"/>
+            <a:off x="457200" y="274638"/>
             <a:ext cx="6019800" cy="5851525"/>
           </a:xfrm>
         </p:spPr>
         <p:txBody>
           <a:bodyPr vert="eaVert"/>
-          <a:lstStyle>
-            <a:extLst/>
-          </a:lstStyle>
+          <a:lstStyle/>
           <a:p>
             <a:pPr lvl="0" eaLnBrk="1" latinLnBrk="0" hangingPunct="1"/>
             <a:r>
@@ -1380,7 +1146,7 @@
             <a:fld id="{2E894346-B744-48A0-AB61-643E2864BD5B}" type="datetimeFigureOut">
               <a:rPr lang="en-US" smtClean="0"/>
               <a:pPr/>
-              <a:t>10/21/2009</a:t>
+              <a:t>13/10/15</a:t>
             </a:fld>
             <a:endParaRPr lang="en-US"/>
           </a:p>
@@ -1396,12 +1162,7 @@
             <p:ph type="ftr" sz="quarter" idx="11"/>
           </p:nvPr>
         </p:nvSpPr>
-        <p:spPr>
-          <a:xfrm>
-            <a:off x="2640597" y="6377459"/>
-            <a:ext cx="3836404" cy="365125"/>
-          </a:xfrm>
-        </p:spPr>
+        <p:spPr/>
         <p:txBody>
           <a:bodyPr/>
           <a:lstStyle/>
@@ -1445,14 +1206,6 @@
 <file path=ppt/slideLayouts/slideLayout2.xml><?xml version="1.0" encoding="utf-8"?>
 <p:sldLayout xmlns:a="http://schemas.openxmlformats.org/drawingml/2006/main" xmlns:r="http://schemas.openxmlformats.org/officeDocument/2006/relationships" xmlns:p="http://schemas.openxmlformats.org/presentationml/2006/main" type="obj" preserve="1">
   <p:cSld name="Title and Content">
-    <p:bg>
-      <p:bgPr>
-        <a:solidFill>
-          <a:schemeClr val="tx1"/>
-        </a:solidFill>
-        <a:effectLst/>
-      </p:bgPr>
-    </p:bg>
     <p:spTree>
       <p:nvGrpSpPr>
         <p:cNvPr id="1" name=""/>
@@ -1477,17 +1230,10 @@
             <p:ph type="title"/>
           </p:nvPr>
         </p:nvSpPr>
-        <p:spPr>
-          <a:xfrm>
-            <a:off x="457200" y="155448"/>
-            <a:ext cx="8229600" cy="1252728"/>
-          </a:xfrm>
-        </p:spPr>
-        <p:txBody>
-          <a:bodyPr/>
-          <a:lstStyle>
-            <a:extLst/>
-          </a:lstStyle>
+        <p:spPr/>
+        <p:txBody>
+          <a:bodyPr/>
+          <a:lstStyle/>
           <a:p>
             <a:r>
               <a:rPr kumimoji="0" lang="en-US" smtClean="0"/>
@@ -1510,79 +1256,42 @@
         <p:spPr/>
         <p:txBody>
           <a:bodyPr/>
-          <a:lstStyle>
-            <a:lvl1pPr>
-              <a:defRPr>
-                <a:solidFill>
-                  <a:schemeClr val="bg1"/>
-                </a:solidFill>
-              </a:defRPr>
-            </a:lvl1pPr>
-            <a:lvl2pPr>
-              <a:defRPr>
-                <a:solidFill>
-                  <a:schemeClr val="bg1"/>
-                </a:solidFill>
-              </a:defRPr>
-            </a:lvl2pPr>
-            <a:lvl3pPr>
-              <a:defRPr>
-                <a:solidFill>
-                  <a:schemeClr val="bg1"/>
-                </a:solidFill>
-              </a:defRPr>
-            </a:lvl3pPr>
-            <a:lvl4pPr>
-              <a:defRPr>
-                <a:solidFill>
-                  <a:schemeClr val="bg1"/>
-                </a:solidFill>
-              </a:defRPr>
-            </a:lvl4pPr>
-            <a:lvl5pPr>
-              <a:defRPr>
-                <a:solidFill>
-                  <a:schemeClr val="bg1"/>
-                </a:solidFill>
-              </a:defRPr>
-            </a:lvl5pPr>
-            <a:extLst/>
-          </a:lstStyle>
+          <a:lstStyle/>
           <a:p>
             <a:pPr lvl="0" eaLnBrk="1" latinLnBrk="0" hangingPunct="1"/>
             <a:r>
-              <a:rPr lang="en-US" dirty="0" smtClean="0"/>
+              <a:rPr lang="en-US" smtClean="0"/>
               <a:t>Click to edit Master text styles</a:t>
             </a:r>
           </a:p>
           <a:p>
             <a:pPr lvl="1" eaLnBrk="1" latinLnBrk="0" hangingPunct="1"/>
             <a:r>
-              <a:rPr lang="en-US" dirty="0" smtClean="0"/>
+              <a:rPr lang="en-US" smtClean="0"/>
               <a:t>Second level</a:t>
             </a:r>
           </a:p>
           <a:p>
             <a:pPr lvl="2" eaLnBrk="1" latinLnBrk="0" hangingPunct="1"/>
             <a:r>
-              <a:rPr lang="en-US" dirty="0" smtClean="0"/>
+              <a:rPr lang="en-US" smtClean="0"/>
               <a:t>Third level</a:t>
             </a:r>
           </a:p>
           <a:p>
             <a:pPr lvl="3" eaLnBrk="1" latinLnBrk="0" hangingPunct="1"/>
             <a:r>
-              <a:rPr lang="en-US" dirty="0" smtClean="0"/>
+              <a:rPr lang="en-US" smtClean="0"/>
               <a:t>Fourth level</a:t>
             </a:r>
           </a:p>
           <a:p>
             <a:pPr lvl="4" eaLnBrk="1" latinLnBrk="0" hangingPunct="1"/>
             <a:r>
-              <a:rPr lang="en-US" dirty="0" smtClean="0"/>
+              <a:rPr lang="en-US" smtClean="0"/>
               <a:t>Fifth level</a:t>
             </a:r>
-            <a:endParaRPr kumimoji="0" lang="en-US" dirty="0"/>
+            <a:endParaRPr kumimoji="0" lang="en-US"/>
           </a:p>
         </p:txBody>
       </p:sp>
@@ -1604,7 +1313,7 @@
             <a:fld id="{2E894346-B744-48A0-AB61-643E2864BD5B}" type="datetimeFigureOut">
               <a:rPr lang="en-US" smtClean="0"/>
               <a:pPr/>
-              <a:t>10/21/2009</a:t>
+              <a:t>13/10/15</a:t>
             </a:fld>
             <a:endParaRPr lang="en-US"/>
           </a:p>
@@ -1662,10 +1371,10 @@
 </file>
 
 <file path=ppt/slideLayouts/slideLayout3.xml><?xml version="1.0" encoding="utf-8"?>
-<p:sldLayout xmlns:a="http://schemas.openxmlformats.org/drawingml/2006/main" xmlns:r="http://schemas.openxmlformats.org/officeDocument/2006/relationships" xmlns:p="http://schemas.openxmlformats.org/presentationml/2006/main" showMasterSp="0" type="secHead" preserve="1">
+<p:sldLayout xmlns:a="http://schemas.openxmlformats.org/drawingml/2006/main" xmlns:r="http://schemas.openxmlformats.org/officeDocument/2006/relationships" xmlns:p="http://schemas.openxmlformats.org/presentationml/2006/main" type="secHead" preserve="1">
   <p:cSld name="Section Header">
     <p:bg>
-      <p:bgRef idx="1002">
+      <p:bgRef idx="1003">
         <a:schemeClr val="bg2"/>
       </p:bgRef>
     </p:bg>
@@ -1685,107 +1394,6 @@
       </p:grpSpPr>
       <p:sp>
         <p:nvSpPr>
-          <p:cNvPr id="9" name="Rectangle 8"/>
-          <p:cNvSpPr/>
-          <p:nvPr/>
-        </p:nvSpPr>
-        <p:spPr bwMode="ltGray">
-          <a:xfrm>
-            <a:off x="0" y="1"/>
-            <a:ext cx="9144000" cy="2602520"/>
-          </a:xfrm>
-          <a:prstGeom prst="rect">
-            <a:avLst/>
-          </a:prstGeom>
-          <a:solidFill>
-            <a:srgbClr val="000000"/>
-          </a:solidFill>
-          <a:ln w="48000" cap="flat" cmpd="thickThin" algn="ctr">
-            <a:noFill/>
-            <a:prstDash val="solid"/>
-          </a:ln>
-        </p:spPr>
-        <p:style>
-          <a:lnRef idx="2">
-            <a:schemeClr val="accent1"/>
-          </a:lnRef>
-          <a:fillRef idx="1">
-            <a:schemeClr val="accent1"/>
-          </a:fillRef>
-          <a:effectRef idx="0">
-            <a:schemeClr val="accent1"/>
-          </a:effectRef>
-          <a:fontRef idx="minor">
-            <a:schemeClr val="lt1"/>
-          </a:fontRef>
-        </p:style>
-        <p:txBody>
-          <a:bodyPr rtlCol="0" anchor="ctr"/>
-          <a:lstStyle>
-            <a:extLst/>
-          </a:lstStyle>
-          <a:p>
-            <a:pPr algn="ctr" eaLnBrk="1" latinLnBrk="0" hangingPunct="1"/>
-            <a:endParaRPr kumimoji="0" lang="en-US"/>
-          </a:p>
-        </p:txBody>
-      </p:sp>
-      <p:sp>
-        <p:nvSpPr>
-          <p:cNvPr id="12" name="Rectangle 11"/>
-          <p:cNvSpPr/>
-          <p:nvPr/>
-        </p:nvSpPr>
-        <p:spPr bwMode="invGray">
-          <a:xfrm>
-            <a:off x="0" y="2602520"/>
-            <a:ext cx="9144000" cy="45720"/>
-          </a:xfrm>
-          <a:prstGeom prst="rect">
-            <a:avLst/>
-          </a:prstGeom>
-          <a:solidFill>
-            <a:srgbClr val="FFFFFF"/>
-          </a:solidFill>
-          <a:ln w="48000" cap="flat" cmpd="thickThin" algn="ctr">
-            <a:noFill/>
-            <a:prstDash val="solid"/>
-          </a:ln>
-          <a:effectLst>
-            <a:outerShdw blurRad="31750" dist="10160" dir="5400000" algn="tl" rotWithShape="0">
-              <a:srgbClr val="000000">
-                <a:alpha val="60000"/>
-              </a:srgbClr>
-            </a:outerShdw>
-          </a:effectLst>
-        </p:spPr>
-        <p:style>
-          <a:lnRef idx="2">
-            <a:schemeClr val="accent1"/>
-          </a:lnRef>
-          <a:fillRef idx="1">
-            <a:schemeClr val="accent1"/>
-          </a:fillRef>
-          <a:effectRef idx="0">
-            <a:schemeClr val="accent1"/>
-          </a:effectRef>
-          <a:fontRef idx="minor">
-            <a:schemeClr val="lt1"/>
-          </a:fontRef>
-        </p:style>
-        <p:txBody>
-          <a:bodyPr rtlCol="0" anchor="ctr"/>
-          <a:lstStyle>
-            <a:extLst/>
-          </a:lstStyle>
-          <a:p>
-            <a:pPr algn="ctr" eaLnBrk="1" latinLnBrk="0" hangingPunct="1"/>
-            <a:endParaRPr kumimoji="0" lang="en-US"/>
-          </a:p>
-        </p:txBody>
-      </p:sp>
-      <p:sp>
-        <p:nvSpPr>
           <p:cNvPr id="2" name="Title 1"/>
           <p:cNvSpPr>
             <a:spLocks noGrp="1"/>
@@ -1796,28 +1404,56 @@
         </p:nvSpPr>
         <p:spPr>
           <a:xfrm>
-            <a:off x="749808" y="118872"/>
-            <a:ext cx="8013192" cy="1636776"/>
+            <a:off x="1600200" y="609600"/>
+            <a:ext cx="7086600" cy="1828800"/>
           </a:xfrm>
         </p:spPr>
         <p:txBody>
-          <a:bodyPr vert="horz" lIns="91440" tIns="0" rIns="91440" bIns="0" rtlCol="0" anchor="b">
-            <a:normAutofit/>
+          <a:bodyPr vert="horz" bIns="0" anchor="b">
+            <a:noAutofit/>
             <a:scene3d>
               <a:camera prst="orthographicFront"/>
-              <a:lightRig rig="threePt" dir="t">
-                <a:rot lat="0" lon="0" rev="4800000"/>
+              <a:lightRig rig="soft" dir="t">
+                <a:rot lat="0" lon="0" rev="17220000"/>
               </a:lightRig>
             </a:scene3d>
-            <a:sp3d prstMaterial="matte">
-              <a:bevelT w="50800" h="10160"/>
+            <a:sp3d prstMaterial="softEdge">
+              <a:bevelT w="38100" h="38100"/>
+              <a:contourClr>
+                <a:schemeClr val="tx2">
+                  <a:shade val="50000"/>
+                </a:schemeClr>
+              </a:contourClr>
             </a:sp3d>
           </a:bodyPr>
           <a:lstStyle>
-            <a:lvl1pPr algn="l">
-              <a:defRPr sz="4700" b="1" cap="none" baseline="0"/>
+            <a:lvl1pPr algn="l" rtl="0">
+              <a:spcBef>
+                <a:spcPct val="0"/>
+              </a:spcBef>
+              <a:buNone/>
+              <a:defRPr sz="4800" b="1" cap="none" baseline="0">
+                <a:ln w="6350">
+                  <a:noFill/>
+                </a:ln>
+                <a:solidFill>
+                  <a:schemeClr val="accent1">
+                    <a:tint val="90000"/>
+                    <a:satMod val="120000"/>
+                  </a:schemeClr>
+                </a:solidFill>
+                <a:effectLst>
+                  <a:outerShdw blurRad="114300" dist="101600" dir="2700000" algn="tl" rotWithShape="0">
+                    <a:srgbClr val="000000">
+                      <a:alpha val="40000"/>
+                    </a:srgbClr>
+                  </a:outerShdw>
+                </a:effectLst>
+                <a:latin typeface="+mj-lt"/>
+                <a:ea typeface="+mj-ea"/>
+                <a:cs typeface="+mj-cs"/>
+              </a:defRPr>
             </a:lvl1pPr>
-            <a:extLst/>
           </a:lstStyle>
           <a:p>
             <a:r>
@@ -1840,22 +1476,22 @@
         </p:nvSpPr>
         <p:spPr>
           <a:xfrm>
-            <a:off x="740664" y="1828800"/>
-            <a:ext cx="8022336" cy="685800"/>
+            <a:off x="1600200" y="2507786"/>
+            <a:ext cx="7086600" cy="1509712"/>
           </a:xfrm>
         </p:spPr>
         <p:txBody>
-          <a:bodyPr lIns="146304" tIns="0" rIns="45720" bIns="0" anchor="t"/>
+          <a:bodyPr anchor="t"/>
           <a:lstStyle>
-            <a:lvl1pPr marL="0" indent="0">
+            <a:lvl1pPr marL="73152" indent="0" algn="l">
               <a:buNone/>
               <a:defRPr sz="2000">
                 <a:solidFill>
-                  <a:srgbClr val="FFFFFF"/>
+                  <a:schemeClr val="tx1"/>
                 </a:solidFill>
               </a:defRPr>
             </a:lvl1pPr>
-            <a:lvl2pPr marL="457200" indent="0">
+            <a:lvl2pPr>
               <a:buNone/>
               <a:defRPr sz="1800">
                 <a:solidFill>
@@ -1865,7 +1501,7 @@
                 </a:solidFill>
               </a:defRPr>
             </a:lvl2pPr>
-            <a:lvl3pPr marL="914400" indent="0">
+            <a:lvl3pPr>
               <a:buNone/>
               <a:defRPr sz="1600">
                 <a:solidFill>
@@ -1875,7 +1511,7 @@
                 </a:solidFill>
               </a:defRPr>
             </a:lvl3pPr>
-            <a:lvl4pPr marL="1371600" indent="0">
+            <a:lvl4pPr>
               <a:buNone/>
               <a:defRPr sz="1400">
                 <a:solidFill>
@@ -1885,7 +1521,7 @@
                 </a:solidFill>
               </a:defRPr>
             </a:lvl4pPr>
-            <a:lvl5pPr marL="1828800" indent="0">
+            <a:lvl5pPr>
               <a:buNone/>
               <a:defRPr sz="1400">
                 <a:solidFill>
@@ -1895,47 +1531,6 @@
                 </a:solidFill>
               </a:defRPr>
             </a:lvl5pPr>
-            <a:lvl6pPr marL="2286000" indent="0">
-              <a:buNone/>
-              <a:defRPr sz="1400">
-                <a:solidFill>
-                  <a:schemeClr val="tx1">
-                    <a:tint val="75000"/>
-                  </a:schemeClr>
-                </a:solidFill>
-              </a:defRPr>
-            </a:lvl6pPr>
-            <a:lvl7pPr marL="2743200" indent="0">
-              <a:buNone/>
-              <a:defRPr sz="1400">
-                <a:solidFill>
-                  <a:schemeClr val="tx1">
-                    <a:tint val="75000"/>
-                  </a:schemeClr>
-                </a:solidFill>
-              </a:defRPr>
-            </a:lvl7pPr>
-            <a:lvl8pPr marL="3200400" indent="0">
-              <a:buNone/>
-              <a:defRPr sz="1400">
-                <a:solidFill>
-                  <a:schemeClr val="tx1">
-                    <a:tint val="75000"/>
-                  </a:schemeClr>
-                </a:solidFill>
-              </a:defRPr>
-            </a:lvl8pPr>
-            <a:lvl9pPr marL="3657600" indent="0">
-              <a:buNone/>
-              <a:defRPr sz="1400">
-                <a:solidFill>
-                  <a:schemeClr val="tx1">
-                    <a:tint val="75000"/>
-                  </a:schemeClr>
-                </a:solidFill>
-              </a:defRPr>
-            </a:lvl9pPr>
-            <a:extLst/>
           </a:lstStyle>
           <a:p>
             <a:pPr lvl="0" eaLnBrk="1" latinLnBrk="0" hangingPunct="1"/>
@@ -1964,7 +1559,7 @@
             <a:fld id="{2E894346-B744-48A0-AB61-643E2864BD5B}" type="datetimeFigureOut">
               <a:rPr lang="en-US" smtClean="0"/>
               <a:pPr/>
-              <a:t>10/21/2009</a:t>
+              <a:t>13/10/15</a:t>
             </a:fld>
             <a:endParaRPr lang="en-US"/>
           </a:p>
@@ -1999,7 +1594,12 @@
             <p:ph type="sldNum" sz="quarter" idx="12"/>
           </p:nvPr>
         </p:nvSpPr>
-        <p:spPr/>
+        <p:spPr>
+          <a:xfrm>
+            <a:off x="7924800" y="6416675"/>
+            <a:ext cx="762000" cy="365125"/>
+          </a:xfrm>
+        </p:spPr>
         <p:txBody>
           <a:bodyPr/>
           <a:lstStyle/>
@@ -2051,9 +1651,7 @@
         <p:spPr/>
         <p:txBody>
           <a:bodyPr/>
-          <a:lstStyle>
-            <a:extLst/>
-          </a:lstStyle>
+          <a:lstStyle/>
           <a:p>
             <a:r>
               <a:rPr kumimoji="0" lang="en-US" smtClean="0"/>
@@ -2075,15 +1673,15 @@
         </p:nvSpPr>
         <p:spPr>
           <a:xfrm>
-            <a:off x="457200" y="1773936"/>
-            <a:ext cx="4038600" cy="4623816"/>
+            <a:off x="457200" y="1600200"/>
+            <a:ext cx="4038600" cy="4525963"/>
           </a:xfrm>
         </p:spPr>
         <p:txBody>
-          <a:bodyPr lIns="91440"/>
+          <a:bodyPr/>
           <a:lstStyle>
             <a:lvl1pPr>
-              <a:defRPr sz="2800"/>
+              <a:defRPr sz="2600"/>
             </a:lvl1pPr>
             <a:lvl2pPr>
               <a:defRPr sz="2400"/>
@@ -2097,19 +1695,6 @@
             <a:lvl5pPr>
               <a:defRPr sz="1800"/>
             </a:lvl5pPr>
-            <a:lvl6pPr>
-              <a:defRPr sz="1800"/>
-            </a:lvl6pPr>
-            <a:lvl7pPr>
-              <a:defRPr sz="1800"/>
-            </a:lvl7pPr>
-            <a:lvl8pPr>
-              <a:defRPr sz="1800"/>
-            </a:lvl8pPr>
-            <a:lvl9pPr>
-              <a:defRPr sz="1800"/>
-            </a:lvl9pPr>
-            <a:extLst/>
           </a:lstStyle>
           <a:p>
             <a:pPr lvl="0" eaLnBrk="1" latinLnBrk="0" hangingPunct="1"/>
@@ -2161,15 +1746,15 @@
         </p:nvSpPr>
         <p:spPr>
           <a:xfrm>
-            <a:off x="4648200" y="1773936"/>
-            <a:ext cx="4038600" cy="4623816"/>
+            <a:off x="4648200" y="1600200"/>
+            <a:ext cx="4038600" cy="4525963"/>
           </a:xfrm>
         </p:spPr>
         <p:txBody>
           <a:bodyPr/>
           <a:lstStyle>
             <a:lvl1pPr>
-              <a:defRPr sz="2800"/>
+              <a:defRPr sz="2600"/>
             </a:lvl1pPr>
             <a:lvl2pPr>
               <a:defRPr sz="2400"/>
@@ -2183,19 +1768,6 @@
             <a:lvl5pPr>
               <a:defRPr sz="1800"/>
             </a:lvl5pPr>
-            <a:lvl6pPr>
-              <a:defRPr sz="1800"/>
-            </a:lvl6pPr>
-            <a:lvl7pPr>
-              <a:defRPr sz="1800"/>
-            </a:lvl7pPr>
-            <a:lvl8pPr>
-              <a:defRPr sz="1800"/>
-            </a:lvl8pPr>
-            <a:lvl9pPr>
-              <a:defRPr sz="1800"/>
-            </a:lvl9pPr>
-            <a:extLst/>
           </a:lstStyle>
           <a:p>
             <a:pPr lvl="0" eaLnBrk="1" latinLnBrk="0" hangingPunct="1"/>
@@ -2253,7 +1825,7 @@
             <a:fld id="{2E894346-B744-48A0-AB61-643E2864BD5B}" type="datetimeFigureOut">
               <a:rPr lang="en-US" smtClean="0"/>
               <a:pPr/>
-              <a:t>10/21/2009</a:t>
+              <a:t>13/10/15</a:t>
             </a:fld>
             <a:endParaRPr lang="en-US"/>
           </a:p>
@@ -2337,14 +1909,18 @@
             <p:ph type="title"/>
           </p:nvPr>
         </p:nvSpPr>
-        <p:spPr/>
-        <p:txBody>
-          <a:bodyPr/>
+        <p:spPr>
+          <a:xfrm>
+            <a:off x="457200" y="273050"/>
+            <a:ext cx="8229600" cy="1143000"/>
+          </a:xfrm>
+        </p:spPr>
+        <p:txBody>
+          <a:bodyPr anchor="ctr"/>
           <a:lstStyle>
             <a:lvl1pPr>
               <a:defRPr/>
             </a:lvl1pPr>
-            <a:extLst/>
           </a:lstStyle>
           <a:p>
             <a:r>
@@ -2367,50 +1943,90 @@
         </p:nvSpPr>
         <p:spPr>
           <a:xfrm>
-            <a:off x="457200" y="1698987"/>
-            <a:ext cx="4040188" cy="715355"/>
+            <a:off x="457200" y="1535112"/>
+            <a:ext cx="4040188" cy="750887"/>
           </a:xfrm>
         </p:spPr>
         <p:txBody>
-          <a:bodyPr lIns="146304" anchor="ctr"/>
+          <a:bodyPr anchor="ctr"/>
           <a:lstStyle>
             <a:lvl1pPr marL="0" indent="0">
               <a:buNone/>
-              <a:defRPr sz="2300" b="1" cap="all" baseline="0"/>
+              <a:defRPr sz="2400" b="0" cap="all" baseline="0">
+                <a:solidFill>
+                  <a:schemeClr val="tx1"/>
+                </a:solidFill>
+              </a:defRPr>
             </a:lvl1pPr>
-            <a:lvl2pPr marL="457200" indent="0">
+            <a:lvl2pPr>
               <a:buNone/>
               <a:defRPr sz="2000" b="1"/>
             </a:lvl2pPr>
-            <a:lvl3pPr marL="914400" indent="0">
+            <a:lvl3pPr>
               <a:buNone/>
               <a:defRPr sz="1800" b="1"/>
             </a:lvl3pPr>
-            <a:lvl4pPr marL="1371600" indent="0">
+            <a:lvl4pPr>
               <a:buNone/>
               <a:defRPr sz="1600" b="1"/>
             </a:lvl4pPr>
-            <a:lvl5pPr marL="1828800" indent="0">
+            <a:lvl5pPr>
               <a:buNone/>
               <a:defRPr sz="1600" b="1"/>
             </a:lvl5pPr>
-            <a:lvl6pPr marL="2286000" indent="0">
+          </a:lstStyle>
+          <a:p>
+            <a:pPr lvl="0" eaLnBrk="1" latinLnBrk="0" hangingPunct="1"/>
+            <a:r>
+              <a:rPr kumimoji="0" lang="en-US" smtClean="0"/>
+              <a:t>Click to edit Master text styles</a:t>
+            </a:r>
+          </a:p>
+        </p:txBody>
+      </p:sp>
+      <p:sp>
+        <p:nvSpPr>
+          <p:cNvPr id="4" name="Text Placeholder 3"/>
+          <p:cNvSpPr>
+            <a:spLocks noGrp="1"/>
+          </p:cNvSpPr>
+          <p:nvPr>
+            <p:ph type="body" sz="half" idx="3"/>
+          </p:nvPr>
+        </p:nvSpPr>
+        <p:spPr>
+          <a:xfrm>
+            <a:off x="4645025" y="1535112"/>
+            <a:ext cx="4041775" cy="750887"/>
+          </a:xfrm>
+        </p:spPr>
+        <p:txBody>
+          <a:bodyPr anchor="ctr"/>
+          <a:lstStyle>
+            <a:lvl1pPr marL="0" indent="0">
+              <a:buNone/>
+              <a:defRPr sz="2400" b="0" cap="all" baseline="0">
+                <a:solidFill>
+                  <a:schemeClr val="tx1"/>
+                </a:solidFill>
+              </a:defRPr>
+            </a:lvl1pPr>
+            <a:lvl2pPr>
+              <a:buNone/>
+              <a:defRPr sz="2000" b="1"/>
+            </a:lvl2pPr>
+            <a:lvl3pPr>
+              <a:buNone/>
+              <a:defRPr sz="1800" b="1"/>
+            </a:lvl3pPr>
+            <a:lvl4pPr>
               <a:buNone/>
               <a:defRPr sz="1600" b="1"/>
-            </a:lvl6pPr>
-            <a:lvl7pPr marL="2743200" indent="0">
+            </a:lvl4pPr>
+            <a:lvl5pPr>
               <a:buNone/>
               <a:defRPr sz="1600" b="1"/>
-            </a:lvl7pPr>
-            <a:lvl8pPr marL="3200400" indent="0">
-              <a:buNone/>
-              <a:defRPr sz="1600" b="1"/>
-            </a:lvl8pPr>
-            <a:lvl9pPr marL="3657600" indent="0">
-              <a:buNone/>
-              <a:defRPr sz="1600" b="1"/>
-            </a:lvl9pPr>
-            <a:extLst/>
+            </a:lvl5pPr>
           </a:lstStyle>
           <a:p>
             <a:pPr lvl="0" eaLnBrk="1" latinLnBrk="0" hangingPunct="1"/>
@@ -2423,18 +2039,18 @@
       </p:sp>
       <p:sp>
         <p:nvSpPr>
-          <p:cNvPr id="4" name="Content Placeholder 3"/>
-          <p:cNvSpPr>
-            <a:spLocks noGrp="1"/>
-          </p:cNvSpPr>
-          <p:nvPr>
-            <p:ph sz="half" idx="2"/>
+          <p:cNvPr id="5" name="Content Placeholder 4"/>
+          <p:cNvSpPr>
+            <a:spLocks noGrp="1"/>
+          </p:cNvSpPr>
+          <p:nvPr>
+            <p:ph sz="quarter" idx="2"/>
           </p:nvPr>
         </p:nvSpPr>
         <p:spPr>
           <a:xfrm>
-            <a:off x="457200" y="2449512"/>
-            <a:ext cx="4040188" cy="3951288"/>
+            <a:off x="457200" y="2362200"/>
+            <a:ext cx="4040188" cy="3763963"/>
           </a:xfrm>
         </p:spPr>
         <p:txBody>
@@ -2455,19 +2071,6 @@
             <a:lvl5pPr>
               <a:defRPr sz="1600"/>
             </a:lvl5pPr>
-            <a:lvl6pPr>
-              <a:defRPr sz="1600"/>
-            </a:lvl6pPr>
-            <a:lvl7pPr>
-              <a:defRPr sz="1600"/>
-            </a:lvl7pPr>
-            <a:lvl8pPr>
-              <a:defRPr sz="1600"/>
-            </a:lvl8pPr>
-            <a:lvl9pPr>
-              <a:defRPr sz="1600"/>
-            </a:lvl9pPr>
-            <a:extLst/>
           </a:lstStyle>
           <a:p>
             <a:pPr lvl="0" eaLnBrk="1" latinLnBrk="0" hangingPunct="1"/>
@@ -2509,84 +2112,18 @@
       </p:sp>
       <p:sp>
         <p:nvSpPr>
-          <p:cNvPr id="5" name="Text Placeholder 4"/>
-          <p:cNvSpPr>
-            <a:spLocks noGrp="1"/>
-          </p:cNvSpPr>
-          <p:nvPr>
-            <p:ph type="body" sz="quarter" idx="3"/>
+          <p:cNvPr id="6" name="Content Placeholder 5"/>
+          <p:cNvSpPr>
+            <a:spLocks noGrp="1"/>
+          </p:cNvSpPr>
+          <p:nvPr>
+            <p:ph sz="quarter" idx="4"/>
           </p:nvPr>
         </p:nvSpPr>
         <p:spPr>
           <a:xfrm>
-            <a:off x="4645025" y="1698987"/>
-            <a:ext cx="4041775" cy="715355"/>
-          </a:xfrm>
-        </p:spPr>
-        <p:txBody>
-          <a:bodyPr lIns="146304" anchor="ctr"/>
-          <a:lstStyle>
-            <a:lvl1pPr marL="0" indent="0">
-              <a:buNone/>
-              <a:defRPr sz="2300" b="1" cap="all" baseline="0"/>
-            </a:lvl1pPr>
-            <a:lvl2pPr marL="457200" indent="0">
-              <a:buNone/>
-              <a:defRPr sz="2000" b="1"/>
-            </a:lvl2pPr>
-            <a:lvl3pPr marL="914400" indent="0">
-              <a:buNone/>
-              <a:defRPr sz="1800" b="1"/>
-            </a:lvl3pPr>
-            <a:lvl4pPr marL="1371600" indent="0">
-              <a:buNone/>
-              <a:defRPr sz="1600" b="1"/>
-            </a:lvl4pPr>
-            <a:lvl5pPr marL="1828800" indent="0">
-              <a:buNone/>
-              <a:defRPr sz="1600" b="1"/>
-            </a:lvl5pPr>
-            <a:lvl6pPr marL="2286000" indent="0">
-              <a:buNone/>
-              <a:defRPr sz="1600" b="1"/>
-            </a:lvl6pPr>
-            <a:lvl7pPr marL="2743200" indent="0">
-              <a:buNone/>
-              <a:defRPr sz="1600" b="1"/>
-            </a:lvl7pPr>
-            <a:lvl8pPr marL="3200400" indent="0">
-              <a:buNone/>
-              <a:defRPr sz="1600" b="1"/>
-            </a:lvl8pPr>
-            <a:lvl9pPr marL="3657600" indent="0">
-              <a:buNone/>
-              <a:defRPr sz="1600" b="1"/>
-            </a:lvl9pPr>
-            <a:extLst/>
-          </a:lstStyle>
-          <a:p>
-            <a:pPr lvl="0" eaLnBrk="1" latinLnBrk="0" hangingPunct="1"/>
-            <a:r>
-              <a:rPr kumimoji="0" lang="en-US" smtClean="0"/>
-              <a:t>Click to edit Master text styles</a:t>
-            </a:r>
-          </a:p>
-        </p:txBody>
-      </p:sp>
-      <p:sp>
-        <p:nvSpPr>
-          <p:cNvPr id="6" name="Content Placeholder 5"/>
-          <p:cNvSpPr>
-            <a:spLocks noGrp="1"/>
-          </p:cNvSpPr>
-          <p:nvPr>
-            <p:ph sz="quarter" idx="4"/>
-          </p:nvPr>
-        </p:nvSpPr>
-        <p:spPr>
-          <a:xfrm>
-            <a:off x="4645025" y="2449512"/>
-            <a:ext cx="4041775" cy="3951288"/>
+            <a:off x="4645025" y="2362200"/>
+            <a:ext cx="4041775" cy="3763963"/>
           </a:xfrm>
         </p:spPr>
         <p:txBody>
@@ -2607,19 +2144,6 @@
             <a:lvl5pPr>
               <a:defRPr sz="1600"/>
             </a:lvl5pPr>
-            <a:lvl6pPr>
-              <a:defRPr sz="1600"/>
-            </a:lvl6pPr>
-            <a:lvl7pPr>
-              <a:defRPr sz="1600"/>
-            </a:lvl7pPr>
-            <a:lvl8pPr>
-              <a:defRPr sz="1600"/>
-            </a:lvl8pPr>
-            <a:lvl9pPr>
-              <a:defRPr sz="1600"/>
-            </a:lvl9pPr>
-            <a:extLst/>
           </a:lstStyle>
           <a:p>
             <a:pPr lvl="0" eaLnBrk="1" latinLnBrk="0" hangingPunct="1"/>
@@ -2677,7 +2201,7 @@
             <a:fld id="{2E894346-B744-48A0-AB61-643E2864BD5B}" type="datetimeFigureOut">
               <a:rPr lang="en-US" smtClean="0"/>
               <a:pPr/>
-              <a:t>10/21/2009</a:t>
+              <a:t>13/10/15</a:t>
             </a:fld>
             <a:endParaRPr lang="en-US"/>
           </a:p>
@@ -2764,9 +2288,7 @@
         <p:spPr/>
         <p:txBody>
           <a:bodyPr/>
-          <a:lstStyle>
-            <a:extLst/>
-          </a:lstStyle>
+          <a:lstStyle/>
           <a:p>
             <a:r>
               <a:rPr kumimoji="0" lang="en-US" smtClean="0"/>
@@ -2794,7 +2316,7 @@
             <a:fld id="{2E894346-B744-48A0-AB61-643E2864BD5B}" type="datetimeFigureOut">
               <a:rPr lang="en-US" smtClean="0"/>
               <a:pPr/>
-              <a:t>10/21/2009</a:t>
+              <a:t>13/10/15</a:t>
             </a:fld>
             <a:endParaRPr lang="en-US"/>
           </a:p>
@@ -2852,7 +2374,7 @@
 </file>
 
 <file path=ppt/slideLayouts/slideLayout7.xml><?xml version="1.0" encoding="utf-8"?>
-<p:sldLayout xmlns:a="http://schemas.openxmlformats.org/drawingml/2006/main" xmlns:r="http://schemas.openxmlformats.org/officeDocument/2006/relationships" xmlns:p="http://schemas.openxmlformats.org/presentationml/2006/main" showMasterSp="0" type="blank" preserve="1">
+<p:sldLayout xmlns:a="http://schemas.openxmlformats.org/drawingml/2006/main" xmlns:r="http://schemas.openxmlformats.org/officeDocument/2006/relationships" xmlns:p="http://schemas.openxmlformats.org/presentationml/2006/main" type="blank" preserve="1">
   <p:cSld name="Blank">
     <p:spTree>
       <p:nvGrpSpPr>
@@ -2886,7 +2408,7 @@
             <a:fld id="{2E894346-B744-48A0-AB61-643E2864BD5B}" type="datetimeFigureOut">
               <a:rPr lang="en-US" smtClean="0"/>
               <a:pPr/>
-              <a:t>10/21/2009</a:t>
+              <a:t>13/10/15</a:t>
             </a:fld>
             <a:endParaRPr lang="en-US"/>
           </a:p>
@@ -2972,20 +2494,30 @@
         </p:nvSpPr>
         <p:spPr>
           <a:xfrm>
-            <a:off x="167838" y="152400"/>
-            <a:ext cx="2523744" cy="978408"/>
+            <a:off x="457200" y="273050"/>
+            <a:ext cx="3008313" cy="1162050"/>
           </a:xfrm>
         </p:spPr>
         <p:txBody>
-          <a:bodyPr vert="horz" lIns="73152" rIns="45720" bIns="0" rtlCol="0" anchor="b">
+          <a:bodyPr vert="horz" anchor="b">
             <a:normAutofit/>
-            <a:sp3d prstMaterial="matte"/>
+            <a:sp3d prstMaterial="softEdge"/>
           </a:bodyPr>
           <a:lstStyle>
             <a:lvl1pPr algn="l">
-              <a:defRPr sz="2000" b="0"/>
+              <a:buNone/>
+              <a:defRPr sz="2200" b="0">
+                <a:ln w="6350">
+                  <a:noFill/>
+                </a:ln>
+                <a:solidFill>
+                  <a:schemeClr val="accent1">
+                    <a:tint val="73000"/>
+                    <a:satMod val="180000"/>
+                  </a:schemeClr>
+                </a:solidFill>
+              </a:defRPr>
             </a:lvl1pPr>
-            <a:extLst/>
           </a:lstStyle>
           <a:p>
             <a:r>
@@ -2998,51 +2530,87 @@
       </p:sp>
       <p:sp>
         <p:nvSpPr>
-          <p:cNvPr id="3" name="Content Placeholder 2"/>
-          <p:cNvSpPr>
-            <a:spLocks noGrp="1"/>
-          </p:cNvSpPr>
-          <p:nvPr>
-            <p:ph idx="1"/>
+          <p:cNvPr id="3" name="Text Placeholder 2"/>
+          <p:cNvSpPr>
+            <a:spLocks noGrp="1"/>
+          </p:cNvSpPr>
+          <p:nvPr>
+            <p:ph type="body" idx="2"/>
           </p:nvPr>
         </p:nvSpPr>
         <p:spPr>
           <a:xfrm>
-            <a:off x="3019377" y="1743133"/>
-            <a:ext cx="5920641" cy="4558885"/>
+            <a:off x="457200" y="1524000"/>
+            <a:ext cx="3008313" cy="4602163"/>
           </a:xfrm>
         </p:spPr>
         <p:txBody>
           <a:bodyPr/>
           <a:lstStyle>
-            <a:lvl1pPr>
-              <a:defRPr sz="3200"/>
+            <a:lvl1pPr marL="0" indent="0">
+              <a:buNone/>
+              <a:defRPr sz="1400"/>
             </a:lvl1pPr>
             <a:lvl2pPr>
-              <a:defRPr sz="2800"/>
+              <a:buNone/>
+              <a:defRPr sz="1200"/>
             </a:lvl2pPr>
             <a:lvl3pPr>
+              <a:buNone/>
+              <a:defRPr sz="1000"/>
+            </a:lvl3pPr>
+            <a:lvl4pPr>
+              <a:buNone/>
+              <a:defRPr sz="900"/>
+            </a:lvl4pPr>
+            <a:lvl5pPr>
+              <a:buNone/>
+              <a:defRPr sz="900"/>
+            </a:lvl5pPr>
+          </a:lstStyle>
+          <a:p>
+            <a:pPr lvl="0" eaLnBrk="1" latinLnBrk="0" hangingPunct="1"/>
+            <a:r>
+              <a:rPr kumimoji="0" lang="en-US" smtClean="0"/>
+              <a:t>Click to edit Master text styles</a:t>
+            </a:r>
+          </a:p>
+        </p:txBody>
+      </p:sp>
+      <p:sp>
+        <p:nvSpPr>
+          <p:cNvPr id="4" name="Content Placeholder 3"/>
+          <p:cNvSpPr>
+            <a:spLocks noGrp="1"/>
+          </p:cNvSpPr>
+          <p:nvPr>
+            <p:ph sz="half" idx="1"/>
+          </p:nvPr>
+        </p:nvSpPr>
+        <p:spPr>
+          <a:xfrm>
+            <a:off x="3575050" y="273050"/>
+            <a:ext cx="5111750" cy="5853113"/>
+          </a:xfrm>
+        </p:spPr>
+        <p:txBody>
+          <a:bodyPr/>
+          <a:lstStyle>
+            <a:lvl1pPr>
+              <a:defRPr sz="2600"/>
+            </a:lvl1pPr>
+            <a:lvl2pPr>
               <a:defRPr sz="2400"/>
+            </a:lvl2pPr>
+            <a:lvl3pPr>
+              <a:defRPr sz="2200"/>
             </a:lvl3pPr>
             <a:lvl4pPr>
               <a:defRPr sz="2000"/>
             </a:lvl4pPr>
             <a:lvl5pPr>
-              <a:defRPr sz="2000"/>
+              <a:defRPr sz="1800"/>
             </a:lvl5pPr>
-            <a:lvl6pPr>
-              <a:defRPr sz="2000"/>
-            </a:lvl6pPr>
-            <a:lvl7pPr>
-              <a:defRPr sz="2000"/>
-            </a:lvl7pPr>
-            <a:lvl8pPr>
-              <a:defRPr sz="2000"/>
-            </a:lvl8pPr>
-            <a:lvl9pPr>
-              <a:defRPr sz="2000"/>
-            </a:lvl9pPr>
-            <a:extLst/>
           </a:lstStyle>
           <a:p>
             <a:pPr lvl="0" eaLnBrk="1" latinLnBrk="0" hangingPunct="1"/>
@@ -3084,72 +2652,6 @@
       </p:sp>
       <p:sp>
         <p:nvSpPr>
-          <p:cNvPr id="4" name="Text Placeholder 3"/>
-          <p:cNvSpPr>
-            <a:spLocks noGrp="1"/>
-          </p:cNvSpPr>
-          <p:nvPr>
-            <p:ph type="body" sz="half" idx="2"/>
-          </p:nvPr>
-        </p:nvSpPr>
-        <p:spPr>
-          <a:xfrm>
-            <a:off x="167838" y="1730018"/>
-            <a:ext cx="2468880" cy="4572000"/>
-          </a:xfrm>
-        </p:spPr>
-        <p:txBody>
-          <a:bodyPr/>
-          <a:lstStyle>
-            <a:lvl1pPr marL="0" indent="0">
-              <a:buNone/>
-              <a:defRPr sz="1400"/>
-            </a:lvl1pPr>
-            <a:lvl2pPr marL="457200" indent="0">
-              <a:buNone/>
-              <a:defRPr sz="1200"/>
-            </a:lvl2pPr>
-            <a:lvl3pPr marL="914400" indent="0">
-              <a:buNone/>
-              <a:defRPr sz="1000"/>
-            </a:lvl3pPr>
-            <a:lvl4pPr marL="1371600" indent="0">
-              <a:buNone/>
-              <a:defRPr sz="900"/>
-            </a:lvl4pPr>
-            <a:lvl5pPr marL="1828800" indent="0">
-              <a:buNone/>
-              <a:defRPr sz="900"/>
-            </a:lvl5pPr>
-            <a:lvl6pPr marL="2286000" indent="0">
-              <a:buNone/>
-              <a:defRPr sz="900"/>
-            </a:lvl6pPr>
-            <a:lvl7pPr marL="2743200" indent="0">
-              <a:buNone/>
-              <a:defRPr sz="900"/>
-            </a:lvl7pPr>
-            <a:lvl8pPr marL="3200400" indent="0">
-              <a:buNone/>
-              <a:defRPr sz="900"/>
-            </a:lvl8pPr>
-            <a:lvl9pPr marL="3657600" indent="0">
-              <a:buNone/>
-              <a:defRPr sz="900"/>
-            </a:lvl9pPr>
-            <a:extLst/>
-          </a:lstStyle>
-          <a:p>
-            <a:pPr lvl="0" eaLnBrk="1" latinLnBrk="0" hangingPunct="1"/>
-            <a:r>
-              <a:rPr kumimoji="0" lang="en-US" smtClean="0"/>
-              <a:t>Click to edit Master text styles</a:t>
-            </a:r>
-          </a:p>
-        </p:txBody>
-      </p:sp>
-      <p:sp>
-        <p:nvSpPr>
           <p:cNvPr id="5" name="Date Placeholder 4"/>
           <p:cNvSpPr>
             <a:spLocks noGrp="1"/>
@@ -3166,7 +2668,7 @@
             <a:fld id="{2E894346-B744-48A0-AB61-643E2864BD5B}" type="datetimeFigureOut">
               <a:rPr lang="en-US" smtClean="0"/>
               <a:pPr/>
-              <a:t>10/21/2009</a:t>
+              <a:t>13/10/15</a:t>
             </a:fld>
             <a:endParaRPr lang="en-US"/>
           </a:p>
@@ -3212,100 +2714,6 @@
               <a:t>‹#›</a:t>
             </a:fld>
             <a:endParaRPr lang="en-US"/>
-          </a:p>
-        </p:txBody>
-      </p:sp>
-      <p:sp>
-        <p:nvSpPr>
-          <p:cNvPr id="12" name="Rectangle 11"/>
-          <p:cNvSpPr/>
-          <p:nvPr/>
-        </p:nvSpPr>
-        <p:spPr bwMode="invGray">
-          <a:xfrm>
-            <a:off x="2855737" y="0"/>
-            <a:ext cx="45720" cy="1453896"/>
-          </a:xfrm>
-          <a:prstGeom prst="rect">
-            <a:avLst/>
-          </a:prstGeom>
-          <a:solidFill>
-            <a:srgbClr val="FFFFFF"/>
-          </a:solidFill>
-          <a:ln w="48000" cap="flat" cmpd="thickThin" algn="ctr">
-            <a:noFill/>
-            <a:prstDash val="solid"/>
-          </a:ln>
-        </p:spPr>
-        <p:style>
-          <a:lnRef idx="2">
-            <a:schemeClr val="accent1"/>
-          </a:lnRef>
-          <a:fillRef idx="1">
-            <a:schemeClr val="accent1"/>
-          </a:fillRef>
-          <a:effectRef idx="0">
-            <a:schemeClr val="accent1"/>
-          </a:effectRef>
-          <a:fontRef idx="minor">
-            <a:schemeClr val="lt1"/>
-          </a:fontRef>
-        </p:style>
-        <p:txBody>
-          <a:bodyPr rtlCol="0" anchor="ctr"/>
-          <a:lstStyle>
-            <a:extLst/>
-          </a:lstStyle>
-          <a:p>
-            <a:pPr algn="ctr" eaLnBrk="1" latinLnBrk="0" hangingPunct="1"/>
-            <a:endParaRPr kumimoji="0" lang="en-US"/>
-          </a:p>
-        </p:txBody>
-      </p:sp>
-      <p:sp>
-        <p:nvSpPr>
-          <p:cNvPr id="9" name="Rectangle 8"/>
-          <p:cNvSpPr/>
-          <p:nvPr/>
-        </p:nvSpPr>
-        <p:spPr bwMode="invGray">
-          <a:xfrm>
-            <a:off x="2855737" y="0"/>
-            <a:ext cx="45720" cy="1453896"/>
-          </a:xfrm>
-          <a:prstGeom prst="rect">
-            <a:avLst/>
-          </a:prstGeom>
-          <a:solidFill>
-            <a:srgbClr val="FFFFFF"/>
-          </a:solidFill>
-          <a:ln w="48000" cap="flat" cmpd="thickThin" algn="ctr">
-            <a:noFill/>
-            <a:prstDash val="solid"/>
-          </a:ln>
-        </p:spPr>
-        <p:style>
-          <a:lnRef idx="2">
-            <a:schemeClr val="accent1"/>
-          </a:lnRef>
-          <a:fillRef idx="1">
-            <a:schemeClr val="accent1"/>
-          </a:fillRef>
-          <a:effectRef idx="0">
-            <a:schemeClr val="accent1"/>
-          </a:effectRef>
-          <a:fontRef idx="minor">
-            <a:schemeClr val="lt1"/>
-          </a:fontRef>
-        </p:style>
-        <p:txBody>
-          <a:bodyPr rtlCol="0" anchor="ctr"/>
-          <a:lstStyle>
-            <a:extLst/>
-          </a:lstStyle>
-          <a:p>
-            <a:pPr algn="ctr" eaLnBrk="1" latinLnBrk="0" hangingPunct="1"/>
-            <a:endParaRPr kumimoji="0" lang="en-US"/>
           </a:p>
         </p:txBody>
       </p:sp>
@@ -3320,8 +2728,274 @@
 <file path=ppt/slideLayouts/slideLayout9.xml><?xml version="1.0" encoding="utf-8"?>
 <p:sldLayout xmlns:a="http://schemas.openxmlformats.org/drawingml/2006/main" xmlns:r="http://schemas.openxmlformats.org/officeDocument/2006/relationships" xmlns:p="http://schemas.openxmlformats.org/presentationml/2006/main" type="picTx" preserve="1">
   <p:cSld name="Picture with Caption">
+    <p:spTree>
+      <p:nvGrpSpPr>
+        <p:cNvPr id="1" name=""/>
+        <p:cNvGrpSpPr/>
+        <p:nvPr/>
+      </p:nvGrpSpPr>
+      <p:grpSpPr>
+        <a:xfrm>
+          <a:off x="0" y="0"/>
+          <a:ext cx="0" cy="0"/>
+          <a:chOff x="0" y="0"/>
+          <a:chExt cx="0" cy="0"/>
+        </a:xfrm>
+      </p:grpSpPr>
+      <p:sp>
+        <p:nvSpPr>
+          <p:cNvPr id="2" name="Title 1"/>
+          <p:cNvSpPr>
+            <a:spLocks noGrp="1"/>
+          </p:cNvSpPr>
+          <p:nvPr>
+            <p:ph type="title"/>
+          </p:nvPr>
+        </p:nvSpPr>
+        <p:spPr>
+          <a:xfrm>
+            <a:off x="1828800" y="609600"/>
+            <a:ext cx="5486400" cy="522288"/>
+          </a:xfrm>
+        </p:spPr>
+        <p:txBody>
+          <a:bodyPr lIns="45720" rIns="45720" bIns="0" anchor="b">
+            <a:sp3d prstMaterial="softEdge"/>
+          </a:bodyPr>
+          <a:lstStyle>
+            <a:lvl1pPr algn="ctr">
+              <a:buNone/>
+              <a:defRPr sz="2000" b="1"/>
+            </a:lvl1pPr>
+          </a:lstStyle>
+          <a:p>
+            <a:r>
+              <a:rPr kumimoji="0" lang="en-US" smtClean="0"/>
+              <a:t>Click to edit Master title style</a:t>
+            </a:r>
+            <a:endParaRPr kumimoji="0" lang="en-US"/>
+          </a:p>
+        </p:txBody>
+      </p:sp>
+      <p:sp>
+        <p:nvSpPr>
+          <p:cNvPr id="3" name="Picture Placeholder 2"/>
+          <p:cNvSpPr>
+            <a:spLocks noGrp="1"/>
+          </p:cNvSpPr>
+          <p:nvPr>
+            <p:ph type="pic" idx="1"/>
+          </p:nvPr>
+        </p:nvSpPr>
+        <p:spPr>
+          <a:xfrm>
+            <a:off x="1828800" y="1831975"/>
+            <a:ext cx="5486400" cy="3962400"/>
+          </a:xfrm>
+          <a:solidFill>
+            <a:schemeClr val="bg2"/>
+          </a:solidFill>
+          <a:ln w="44450" cap="sq" cmpd="sng" algn="ctr">
+            <a:solidFill>
+              <a:srgbClr val="FFFFFF"/>
+            </a:solidFill>
+            <a:prstDash val="solid"/>
+            <a:miter lim="800000"/>
+          </a:ln>
+          <a:effectLst>
+            <a:outerShdw blurRad="190500" dist="228600" dir="2700000" sy="90000">
+              <a:srgbClr val="000000">
+                <a:alpha val="25000"/>
+              </a:srgbClr>
+            </a:outerShdw>
+          </a:effectLst>
+          <a:scene3d>
+            <a:camera prst="orthographicFront">
+              <a:rot lat="0" lon="0" rev="0"/>
+            </a:camera>
+            <a:lightRig rig="balanced" dir="tr">
+              <a:rot lat="0" lon="0" rev="2700000"/>
+            </a:lightRig>
+          </a:scene3d>
+          <a:sp3d prstMaterial="matte">
+            <a:contourClr>
+              <a:schemeClr val="tx2">
+                <a:shade val="50000"/>
+              </a:schemeClr>
+            </a:contourClr>
+          </a:sp3d>
+        </p:spPr>
+        <p:style>
+          <a:lnRef idx="3">
+            <a:schemeClr val="lt1"/>
+          </a:lnRef>
+          <a:fillRef idx="1">
+            <a:schemeClr val="accent1"/>
+          </a:fillRef>
+          <a:effectRef idx="1">
+            <a:schemeClr val="accent1"/>
+          </a:effectRef>
+          <a:fontRef idx="minor">
+            <a:schemeClr val="lt1"/>
+          </a:fontRef>
+        </p:style>
+        <p:txBody>
+          <a:bodyPr anchor="t"/>
+          <a:lstStyle>
+            <a:lvl1pPr indent="0">
+              <a:buNone/>
+              <a:defRPr sz="3200"/>
+            </a:lvl1pPr>
+          </a:lstStyle>
+          <a:p>
+            <a:pPr marL="0" algn="l" rtl="0" eaLnBrk="1" latinLnBrk="0" hangingPunct="1"/>
+            <a:r>
+              <a:rPr kumimoji="0" lang="en-US" smtClean="0">
+                <a:solidFill>
+                  <a:schemeClr val="lt1"/>
+                </a:solidFill>
+                <a:latin typeface="+mn-lt"/>
+                <a:ea typeface="+mn-ea"/>
+                <a:cs typeface="+mn-cs"/>
+              </a:rPr>
+              <a:t>Click icon to add picture</a:t>
+            </a:r>
+            <a:endParaRPr kumimoji="0" lang="en-US" dirty="0">
+              <a:solidFill>
+                <a:schemeClr val="lt1"/>
+              </a:solidFill>
+              <a:latin typeface="+mn-lt"/>
+              <a:ea typeface="+mn-ea"/>
+              <a:cs typeface="+mn-cs"/>
+            </a:endParaRPr>
+          </a:p>
+        </p:txBody>
+      </p:sp>
+      <p:sp>
+        <p:nvSpPr>
+          <p:cNvPr id="4" name="Text Placeholder 3"/>
+          <p:cNvSpPr>
+            <a:spLocks noGrp="1"/>
+          </p:cNvSpPr>
+          <p:nvPr>
+            <p:ph type="body" sz="half" idx="2"/>
+          </p:nvPr>
+        </p:nvSpPr>
+        <p:spPr>
+          <a:xfrm>
+            <a:off x="1828800" y="1166787"/>
+            <a:ext cx="5486400" cy="530352"/>
+          </a:xfrm>
+        </p:spPr>
+        <p:txBody>
+          <a:bodyPr lIns="45720" tIns="45720" rIns="45720" anchor="t"/>
+          <a:lstStyle>
+            <a:lvl1pPr marL="0" indent="0" algn="ctr">
+              <a:buNone/>
+              <a:defRPr sz="1400"/>
+            </a:lvl1pPr>
+            <a:lvl2pPr>
+              <a:defRPr sz="1200"/>
+            </a:lvl2pPr>
+            <a:lvl3pPr>
+              <a:defRPr sz="1000"/>
+            </a:lvl3pPr>
+            <a:lvl4pPr>
+              <a:defRPr sz="900"/>
+            </a:lvl4pPr>
+            <a:lvl5pPr>
+              <a:defRPr sz="900"/>
+            </a:lvl5pPr>
+          </a:lstStyle>
+          <a:p>
+            <a:pPr lvl="0" eaLnBrk="1" latinLnBrk="0" hangingPunct="1"/>
+            <a:r>
+              <a:rPr kumimoji="0" lang="en-US" smtClean="0"/>
+              <a:t>Click to edit Master text styles</a:t>
+            </a:r>
+          </a:p>
+        </p:txBody>
+      </p:sp>
+      <p:sp>
+        <p:nvSpPr>
+          <p:cNvPr id="5" name="Date Placeholder 4"/>
+          <p:cNvSpPr>
+            <a:spLocks noGrp="1"/>
+          </p:cNvSpPr>
+          <p:nvPr>
+            <p:ph type="dt" sz="half" idx="10"/>
+          </p:nvPr>
+        </p:nvSpPr>
+        <p:spPr/>
+        <p:txBody>
+          <a:bodyPr/>
+          <a:lstStyle/>
+          <a:p>
+            <a:fld id="{2E894346-B744-48A0-AB61-643E2864BD5B}" type="datetimeFigureOut">
+              <a:rPr lang="en-US" smtClean="0"/>
+              <a:pPr/>
+              <a:t>13/10/15</a:t>
+            </a:fld>
+            <a:endParaRPr lang="en-US"/>
+          </a:p>
+        </p:txBody>
+      </p:sp>
+      <p:sp>
+        <p:nvSpPr>
+          <p:cNvPr id="6" name="Footer Placeholder 5"/>
+          <p:cNvSpPr>
+            <a:spLocks noGrp="1"/>
+          </p:cNvSpPr>
+          <p:nvPr>
+            <p:ph type="ftr" sz="quarter" idx="11"/>
+          </p:nvPr>
+        </p:nvSpPr>
+        <p:spPr/>
+        <p:txBody>
+          <a:bodyPr/>
+          <a:lstStyle/>
+          <a:p>
+            <a:endParaRPr lang="en-US"/>
+          </a:p>
+        </p:txBody>
+      </p:sp>
+      <p:sp>
+        <p:nvSpPr>
+          <p:cNvPr id="7" name="Slide Number Placeholder 6"/>
+          <p:cNvSpPr>
+            <a:spLocks noGrp="1"/>
+          </p:cNvSpPr>
+          <p:nvPr>
+            <p:ph type="sldNum" sz="quarter" idx="12"/>
+          </p:nvPr>
+        </p:nvSpPr>
+        <p:spPr/>
+        <p:txBody>
+          <a:bodyPr/>
+          <a:lstStyle/>
+          <a:p>
+            <a:fld id="{E20792DC-04E7-413D-B463-DF2B337F2D3F}" type="slidenum">
+              <a:rPr lang="en-US" smtClean="0"/>
+              <a:pPr/>
+              <a:t>‹#›</a:t>
+            </a:fld>
+            <a:endParaRPr lang="en-US"/>
+          </a:p>
+        </p:txBody>
+      </p:sp>
+    </p:spTree>
+  </p:cSld>
+  <p:clrMapOvr>
+    <a:masterClrMapping/>
+  </p:clrMapOvr>
+</p:sldLayout>
+</file>
+
+<file path=ppt/slideMasters/slideMaster1.xml><?xml version="1.0" encoding="utf-8"?>
+<p:sldMaster xmlns:a="http://schemas.openxmlformats.org/drawingml/2006/main" xmlns:r="http://schemas.openxmlformats.org/officeDocument/2006/relationships" xmlns:p="http://schemas.openxmlformats.org/presentationml/2006/main">
+  <p:cSld>
     <p:bg>
-      <p:bgRef idx="1001">
+      <p:bgRef idx="1003">
         <a:schemeClr val="bg2"/>
       </p:bgRef>
     </p:bg>
@@ -3341,7 +3015,7 @@
       </p:grpSpPr>
       <p:sp>
         <p:nvSpPr>
-          <p:cNvPr id="2" name="Title 1"/>
+          <p:cNvPr id="22" name="Title Placeholder 21"/>
           <p:cNvSpPr>
             <a:spLocks noGrp="1"/>
           </p:cNvSpPr>
@@ -3351,312 +3025,124 @@
         </p:nvSpPr>
         <p:spPr>
           <a:xfrm>
-            <a:off x="164592" y="155448"/>
-            <a:ext cx="2525150" cy="978408"/>
-          </a:xfrm>
-        </p:spPr>
-        <p:txBody>
-          <a:bodyPr lIns="73152" bIns="0" anchor="b">
-            <a:sp3d prstMaterial="matte"/>
-          </a:bodyPr>
-          <a:lstStyle>
-            <a:lvl1pPr algn="l">
-              <a:defRPr sz="2000" b="0"/>
-            </a:lvl1pPr>
-            <a:extLst/>
-          </a:lstStyle>
-          <a:p>
-            <a:r>
-              <a:rPr kumimoji="0" lang="en-US" smtClean="0"/>
-              <a:t>Click to edit Master title style</a:t>
-            </a:r>
-            <a:endParaRPr kumimoji="0" lang="en-US"/>
-          </a:p>
-        </p:txBody>
-      </p:sp>
-      <p:sp>
-        <p:nvSpPr>
-          <p:cNvPr id="3" name="Picture Placeholder 2"/>
-          <p:cNvSpPr>
-            <a:spLocks noGrp="1"/>
-          </p:cNvSpPr>
-          <p:nvPr>
-            <p:ph type="pic" idx="1"/>
-          </p:nvPr>
-        </p:nvSpPr>
-        <p:spPr>
-          <a:xfrm>
-            <a:off x="2903805" y="1484808"/>
-            <a:ext cx="6247397" cy="5373192"/>
-          </a:xfrm>
-          <a:solidFill>
-            <a:schemeClr val="bg2">
-              <a:shade val="75000"/>
-            </a:schemeClr>
-          </a:solidFill>
-        </p:spPr>
-        <p:txBody>
-          <a:bodyPr/>
-          <a:lstStyle>
-            <a:lvl1pPr marL="0" indent="0">
-              <a:buNone/>
-              <a:defRPr sz="3200"/>
-            </a:lvl1pPr>
-            <a:lvl2pPr marL="457200" indent="0">
-              <a:buNone/>
-              <a:defRPr sz="2800"/>
-            </a:lvl2pPr>
-            <a:lvl3pPr marL="914400" indent="0">
-              <a:buNone/>
-              <a:defRPr sz="2400"/>
-            </a:lvl3pPr>
-            <a:lvl4pPr marL="1371600" indent="0">
-              <a:buNone/>
-              <a:defRPr sz="2000"/>
-            </a:lvl4pPr>
-            <a:lvl5pPr marL="1828800" indent="0">
-              <a:buNone/>
-              <a:defRPr sz="2000"/>
-            </a:lvl5pPr>
-            <a:lvl6pPr marL="2286000" indent="0">
-              <a:buNone/>
-              <a:defRPr sz="2000"/>
-            </a:lvl6pPr>
-            <a:lvl7pPr marL="2743200" indent="0">
-              <a:buNone/>
-              <a:defRPr sz="2000"/>
-            </a:lvl7pPr>
-            <a:lvl8pPr marL="3200400" indent="0">
-              <a:buNone/>
-              <a:defRPr sz="2000"/>
-            </a:lvl8pPr>
-            <a:lvl9pPr marL="3657600" indent="0">
-              <a:buNone/>
-              <a:defRPr sz="2000"/>
-            </a:lvl9pPr>
-            <a:extLst/>
-          </a:lstStyle>
-          <a:p>
-            <a:r>
-              <a:rPr kumimoji="0" lang="en-US" smtClean="0"/>
-              <a:t>Click icon to add picture</a:t>
-            </a:r>
-            <a:endParaRPr kumimoji="0" lang="en-US" dirty="0"/>
-          </a:p>
-        </p:txBody>
-      </p:sp>
-      <p:sp>
-        <p:nvSpPr>
-          <p:cNvPr id="4" name="Text Placeholder 3"/>
-          <p:cNvSpPr>
-            <a:spLocks noGrp="1"/>
-          </p:cNvSpPr>
-          <p:nvPr>
-            <p:ph type="body" sz="half" idx="2"/>
-          </p:nvPr>
-        </p:nvSpPr>
-        <p:spPr>
-          <a:xfrm>
-            <a:off x="164592" y="1728216"/>
-            <a:ext cx="2468880" cy="4572000"/>
-          </a:xfrm>
-        </p:spPr>
-        <p:txBody>
-          <a:bodyPr/>
-          <a:lstStyle>
-            <a:lvl1pPr marL="0" indent="0">
-              <a:buNone/>
-              <a:defRPr sz="1400"/>
-            </a:lvl1pPr>
-            <a:lvl2pPr marL="457200" indent="0">
-              <a:buNone/>
-              <a:defRPr sz="1200"/>
-            </a:lvl2pPr>
-            <a:lvl3pPr marL="914400" indent="0">
-              <a:buNone/>
-              <a:defRPr sz="1000"/>
-            </a:lvl3pPr>
-            <a:lvl4pPr marL="1371600" indent="0">
-              <a:buNone/>
-              <a:defRPr sz="900"/>
-            </a:lvl4pPr>
-            <a:lvl5pPr marL="1828800" indent="0">
-              <a:buNone/>
-              <a:defRPr sz="900"/>
-            </a:lvl5pPr>
-            <a:lvl6pPr marL="2286000" indent="0">
-              <a:buNone/>
-              <a:defRPr sz="900"/>
-            </a:lvl6pPr>
-            <a:lvl7pPr marL="2743200" indent="0">
-              <a:buNone/>
-              <a:defRPr sz="900"/>
-            </a:lvl7pPr>
-            <a:lvl8pPr marL="3200400" indent="0">
-              <a:buNone/>
-              <a:defRPr sz="900"/>
-            </a:lvl8pPr>
-            <a:lvl9pPr marL="3657600" indent="0">
-              <a:buNone/>
-              <a:defRPr sz="900"/>
-            </a:lvl9pPr>
-            <a:extLst/>
-          </a:lstStyle>
-          <a:p>
-            <a:pPr lvl="0" eaLnBrk="1" latinLnBrk="0" hangingPunct="1"/>
-            <a:r>
-              <a:rPr kumimoji="0" lang="en-US" smtClean="0"/>
-              <a:t>Click to edit Master text styles</a:t>
-            </a:r>
-          </a:p>
-        </p:txBody>
-      </p:sp>
-      <p:sp>
-        <p:nvSpPr>
-          <p:cNvPr id="5" name="Date Placeholder 4"/>
-          <p:cNvSpPr>
-            <a:spLocks noGrp="1"/>
-          </p:cNvSpPr>
-          <p:nvPr>
-            <p:ph type="dt" sz="half" idx="10"/>
-          </p:nvPr>
-        </p:nvSpPr>
-        <p:spPr>
-          <a:xfrm>
-            <a:off x="164592" y="1170432"/>
-            <a:ext cx="2523744" cy="201168"/>
-          </a:xfrm>
-        </p:spPr>
-        <p:txBody>
-          <a:bodyPr/>
-          <a:lstStyle/>
-          <a:p>
-            <a:fld id="{2E894346-B744-48A0-AB61-643E2864BD5B}" type="datetimeFigureOut">
-              <a:rPr lang="en-US" smtClean="0"/>
-              <a:pPr/>
-              <a:t>10/21/2009</a:t>
-            </a:fld>
-            <a:endParaRPr lang="en-US"/>
-          </a:p>
-        </p:txBody>
-      </p:sp>
-      <p:sp>
-        <p:nvSpPr>
-          <p:cNvPr id="11" name="Rectangle 10"/>
-          <p:cNvSpPr/>
-          <p:nvPr/>
-        </p:nvSpPr>
-        <p:spPr>
-          <a:xfrm>
-            <a:off x="2855737" y="0"/>
-            <a:ext cx="45720" cy="6858000"/>
+            <a:off x="457200" y="274638"/>
+            <a:ext cx="8229600" cy="1143000"/>
           </a:xfrm>
           <a:prstGeom prst="rect">
             <a:avLst/>
           </a:prstGeom>
-          <a:solidFill>
-            <a:srgbClr val="FFFFFF"/>
-          </a:solidFill>
-          <a:ln w="48000" cap="flat" cmpd="thickThin" algn="ctr">
-            <a:noFill/>
-            <a:prstDash val="solid"/>
-          </a:ln>
         </p:spPr>
-        <p:style>
-          <a:lnRef idx="2">
-            <a:schemeClr val="accent1"/>
-          </a:lnRef>
-          <a:fillRef idx="1">
-            <a:schemeClr val="accent1"/>
-          </a:fillRef>
-          <a:effectRef idx="0">
-            <a:schemeClr val="accent1"/>
-          </a:effectRef>
-          <a:fontRef idx="minor">
-            <a:schemeClr val="lt1"/>
-          </a:fontRef>
-        </p:style>
-        <p:txBody>
-          <a:bodyPr rtlCol="0" anchor="ctr"/>
-          <a:lstStyle>
-            <a:extLst/>
-          </a:lstStyle>
-          <a:p>
-            <a:pPr algn="ctr" eaLnBrk="1" latinLnBrk="0" hangingPunct="1"/>
+        <p:txBody>
+          <a:bodyPr vert="horz" anchor="ctr">
+            <a:normAutofit/>
+            <a:scene3d>
+              <a:camera prst="orthographicFront"/>
+              <a:lightRig rig="soft" dir="t">
+                <a:rot lat="0" lon="0" rev="16800000"/>
+              </a:lightRig>
+            </a:scene3d>
+            <a:sp3d prstMaterial="softEdge">
+              <a:bevelT w="38100" h="38100"/>
+            </a:sp3d>
+          </a:bodyPr>
+          <a:lstStyle/>
+          <a:p>
+            <a:r>
+              <a:rPr kumimoji="0" lang="en-US" smtClean="0"/>
+              <a:t>Click to edit Master title style</a:t>
+            </a:r>
             <a:endParaRPr kumimoji="0" lang="en-US"/>
           </a:p>
         </p:txBody>
       </p:sp>
       <p:sp>
         <p:nvSpPr>
-          <p:cNvPr id="9" name="Rectangle 8"/>
-          <p:cNvSpPr/>
-          <p:nvPr/>
-        </p:nvSpPr>
-        <p:spPr bwMode="invGray">
+          <p:cNvPr id="13" name="Text Placeholder 12"/>
+          <p:cNvSpPr>
+            <a:spLocks noGrp="1"/>
+          </p:cNvSpPr>
+          <p:nvPr>
+            <p:ph type="body" idx="1"/>
+          </p:nvPr>
+        </p:nvSpPr>
+        <p:spPr>
           <a:xfrm>
-            <a:off x="2855737" y="0"/>
-            <a:ext cx="45720" cy="6858000"/>
+            <a:off x="457200" y="1600200"/>
+            <a:ext cx="8229600" cy="4709160"/>
           </a:xfrm>
           <a:prstGeom prst="rect">
             <a:avLst/>
           </a:prstGeom>
-          <a:solidFill>
-            <a:srgbClr val="FFFFFF"/>
-          </a:solidFill>
-          <a:ln w="48000" cap="flat" cmpd="thickThin" algn="ctr">
-            <a:noFill/>
-            <a:prstDash val="solid"/>
-          </a:ln>
         </p:spPr>
-        <p:style>
-          <a:lnRef idx="2">
-            <a:schemeClr val="accent1"/>
-          </a:lnRef>
-          <a:fillRef idx="1">
-            <a:schemeClr val="accent1"/>
-          </a:fillRef>
-          <a:effectRef idx="0">
-            <a:schemeClr val="accent1"/>
-          </a:effectRef>
-          <a:fontRef idx="minor">
-            <a:schemeClr val="lt1"/>
-          </a:fontRef>
-        </p:style>
-        <p:txBody>
-          <a:bodyPr rtlCol="0" anchor="ctr"/>
-          <a:lstStyle>
-            <a:extLst/>
-          </a:lstStyle>
-          <a:p>
-            <a:pPr algn="ctr" eaLnBrk="1" latinLnBrk="0" hangingPunct="1"/>
+        <p:txBody>
+          <a:bodyPr vert="horz">
+            <a:normAutofit/>
+          </a:bodyPr>
+          <a:lstStyle/>
+          <a:p>
+            <a:pPr lvl="0" eaLnBrk="1" latinLnBrk="0" hangingPunct="1"/>
+            <a:r>
+              <a:rPr kumimoji="0" lang="en-US" smtClean="0"/>
+              <a:t>Click to edit Master text styles</a:t>
+            </a:r>
+          </a:p>
+          <a:p>
+            <a:pPr lvl="1" eaLnBrk="1" latinLnBrk="0" hangingPunct="1"/>
+            <a:r>
+              <a:rPr kumimoji="0" lang="en-US" smtClean="0"/>
+              <a:t>Second level</a:t>
+            </a:r>
+          </a:p>
+          <a:p>
+            <a:pPr lvl="2" eaLnBrk="1" latinLnBrk="0" hangingPunct="1"/>
+            <a:r>
+              <a:rPr kumimoji="0" lang="en-US" smtClean="0"/>
+              <a:t>Third level</a:t>
+            </a:r>
+          </a:p>
+          <a:p>
+            <a:pPr lvl="3" eaLnBrk="1" latinLnBrk="0" hangingPunct="1"/>
+            <a:r>
+              <a:rPr kumimoji="0" lang="en-US" smtClean="0"/>
+              <a:t>Fourth level</a:t>
+            </a:r>
+          </a:p>
+          <a:p>
+            <a:pPr lvl="4" eaLnBrk="1" latinLnBrk="0" hangingPunct="1"/>
+            <a:r>
+              <a:rPr kumimoji="0" lang="en-US" smtClean="0"/>
+              <a:t>Fifth level</a:t>
+            </a:r>
             <a:endParaRPr kumimoji="0" lang="en-US"/>
           </a:p>
         </p:txBody>
       </p:sp>
       <p:sp>
         <p:nvSpPr>
-          <p:cNvPr id="6" name="Footer Placeholder 5"/>
-          <p:cNvSpPr>
-            <a:spLocks noGrp="1"/>
-          </p:cNvSpPr>
-          <p:nvPr>
-            <p:ph type="ftr" sz="quarter" idx="11"/>
+          <p:cNvPr id="14" name="Date Placeholder 13"/>
+          <p:cNvSpPr>
+            <a:spLocks noGrp="1"/>
+          </p:cNvSpPr>
+          <p:nvPr>
+            <p:ph type="dt" sz="half" idx="2"/>
           </p:nvPr>
         </p:nvSpPr>
         <p:spPr>
           <a:xfrm>
-            <a:off x="3035808" y="1170432"/>
-            <a:ext cx="5193792" cy="201168"/>
+            <a:off x="457200" y="6416675"/>
+            <a:ext cx="2133600" cy="365125"/>
           </a:xfrm>
+          <a:prstGeom prst="rect">
+            <a:avLst/>
+          </a:prstGeom>
         </p:spPr>
         <p:txBody>
-          <a:bodyPr/>
+          <a:bodyPr vert="horz" anchor="b"/>
           <a:lstStyle>
-            <a:lvl1pPr>
-              <a:defRPr>
+            <a:lvl1pPr algn="l" eaLnBrk="1" latinLnBrk="0" hangingPunct="1">
+              <a:defRPr kumimoji="0" sz="1200">
                 <a:solidFill>
-                  <a:schemeClr val="bg1">
+                  <a:schemeClr val="tx1">
                     <a:shade val="50000"/>
                   </a:schemeClr>
                 </a:solidFill>
@@ -3664,391 +3150,83 @@
             </a:lvl1pPr>
           </a:lstStyle>
           <a:p>
+            <a:fld id="{2E894346-B744-48A0-AB61-643E2864BD5B}" type="datetimeFigureOut">
+              <a:rPr lang="en-US" smtClean="0"/>
+              <a:pPr/>
+              <a:t>13/10/15</a:t>
+            </a:fld>
             <a:endParaRPr lang="en-US"/>
           </a:p>
         </p:txBody>
       </p:sp>
       <p:sp>
         <p:nvSpPr>
-          <p:cNvPr id="7" name="Slide Number Placeholder 6"/>
-          <p:cNvSpPr>
-            <a:spLocks noGrp="1"/>
-          </p:cNvSpPr>
-          <p:nvPr>
-            <p:ph type="sldNum" sz="quarter" idx="12"/>
+          <p:cNvPr id="3" name="Footer Placeholder 2"/>
+          <p:cNvSpPr>
+            <a:spLocks noGrp="1"/>
+          </p:cNvSpPr>
+          <p:nvPr>
+            <p:ph type="ftr" sz="quarter" idx="3"/>
           </p:nvPr>
         </p:nvSpPr>
         <p:spPr>
           <a:xfrm>
-            <a:off x="8339328" y="1170432"/>
-            <a:ext cx="733864" cy="201168"/>
-          </a:xfrm>
-        </p:spPr>
-        <p:txBody>
-          <a:bodyPr/>
-          <a:lstStyle/>
-          <a:p>
-            <a:fld id="{E20792DC-04E7-413D-B463-DF2B337F2D3F}" type="slidenum">
-              <a:rPr lang="en-US" smtClean="0"/>
-              <a:pPr/>
-              <a:t>‹#›</a:t>
-            </a:fld>
-            <a:endParaRPr lang="en-US"/>
-          </a:p>
-        </p:txBody>
-      </p:sp>
-    </p:spTree>
-  </p:cSld>
-  <p:clrMapOvr>
-    <a:overrideClrMapping bg1="lt1" tx1="dk1" bg2="lt2" tx2="dk2" accent1="accent1" accent2="accent2" accent3="accent3" accent4="accent4" accent5="accent5" accent6="accent6" hlink="hlink" folHlink="folHlink"/>
-  </p:clrMapOvr>
-</p:sldLayout>
-</file>
-
-<file path=ppt/slideMasters/slideMaster1.xml><?xml version="1.0" encoding="utf-8"?>
-<p:sldMaster xmlns:a="http://schemas.openxmlformats.org/drawingml/2006/main" xmlns:r="http://schemas.openxmlformats.org/officeDocument/2006/relationships" xmlns:p="http://schemas.openxmlformats.org/presentationml/2006/main">
-  <p:cSld>
-    <p:bg>
-      <p:bgRef idx="1001">
-        <a:schemeClr val="bg1"/>
-      </p:bgRef>
-    </p:bg>
-    <p:spTree>
-      <p:nvGrpSpPr>
-        <p:cNvPr id="1" name=""/>
-        <p:cNvGrpSpPr/>
-        <p:nvPr/>
-      </p:nvGrpSpPr>
-      <p:grpSpPr>
-        <a:xfrm>
-          <a:off x="0" y="0"/>
-          <a:ext cx="0" cy="0"/>
-          <a:chOff x="0" y="0"/>
-          <a:chExt cx="0" cy="0"/>
-        </a:xfrm>
-      </p:grpSpPr>
-      <p:sp>
-        <p:nvSpPr>
-          <p:cNvPr id="10" name="Rectangle 9"/>
-          <p:cNvSpPr/>
-          <p:nvPr/>
-        </p:nvSpPr>
-        <p:spPr bwMode="invGray">
-          <a:xfrm>
-            <a:off x="0" y="1435895"/>
-            <a:ext cx="9144000" cy="45720"/>
-          </a:xfrm>
-          <a:prstGeom prst="rect">
-            <a:avLst/>
-          </a:prstGeom>
-          <a:solidFill>
-            <a:srgbClr val="FFFFFF"/>
-          </a:solidFill>
-          <a:ln w="48000" cap="flat" cmpd="thickThin" algn="ctr">
-            <a:noFill/>
-            <a:prstDash val="solid"/>
-          </a:ln>
-          <a:effectLst>
-            <a:outerShdw blurRad="31750" dist="10160" dir="5400000" algn="tl" rotWithShape="0">
-              <a:srgbClr val="000000">
-                <a:alpha val="60000"/>
-              </a:srgbClr>
-            </a:outerShdw>
-          </a:effectLst>
-        </p:spPr>
-        <p:style>
-          <a:lnRef idx="2">
-            <a:schemeClr val="accent1"/>
-          </a:lnRef>
-          <a:fillRef idx="1">
-            <a:schemeClr val="accent1"/>
-          </a:fillRef>
-          <a:effectRef idx="0">
-            <a:schemeClr val="accent1"/>
-          </a:effectRef>
-          <a:fontRef idx="minor">
-            <a:schemeClr val="lt1"/>
-          </a:fontRef>
-        </p:style>
-        <p:txBody>
-          <a:bodyPr rtlCol="0" anchor="ctr"/>
-          <a:lstStyle>
-            <a:extLst/>
-          </a:lstStyle>
-          <a:p>
-            <a:pPr algn="ctr" eaLnBrk="1" latinLnBrk="0" hangingPunct="1"/>
-            <a:endParaRPr kumimoji="0" lang="en-US"/>
-          </a:p>
-        </p:txBody>
-      </p:sp>
-      <p:sp>
-        <p:nvSpPr>
-          <p:cNvPr id="7" name="Rectangle 6"/>
-          <p:cNvSpPr/>
-          <p:nvPr/>
-        </p:nvSpPr>
-        <p:spPr bwMode="ltGray">
-          <a:xfrm>
-            <a:off x="0" y="0"/>
-            <a:ext cx="9143999" cy="1433733"/>
-          </a:xfrm>
-          <a:prstGeom prst="rect">
-            <a:avLst/>
-          </a:prstGeom>
-          <a:solidFill>
-            <a:srgbClr val="000000"/>
-          </a:solidFill>
-          <a:ln w="48000" cap="flat" cmpd="thickThin" algn="ctr">
-            <a:noFill/>
-            <a:prstDash val="solid"/>
-          </a:ln>
-        </p:spPr>
-        <p:style>
-          <a:lnRef idx="2">
-            <a:schemeClr val="accent1"/>
-          </a:lnRef>
-          <a:fillRef idx="1">
-            <a:schemeClr val="accent1"/>
-          </a:fillRef>
-          <a:effectRef idx="0">
-            <a:schemeClr val="accent1"/>
-          </a:effectRef>
-          <a:fontRef idx="minor">
-            <a:schemeClr val="lt1"/>
-          </a:fontRef>
-        </p:style>
-        <p:txBody>
-          <a:bodyPr rtlCol="0" anchor="ctr"/>
-          <a:lstStyle>
-            <a:extLst/>
-          </a:lstStyle>
-          <a:p>
-            <a:pPr algn="ctr" eaLnBrk="1" latinLnBrk="0" hangingPunct="1"/>
-            <a:endParaRPr kumimoji="0" lang="en-US"/>
-          </a:p>
-        </p:txBody>
-      </p:sp>
-      <p:sp>
-        <p:nvSpPr>
-          <p:cNvPr id="2" name="Title Placeholder 1"/>
-          <p:cNvSpPr>
-            <a:spLocks noGrp="1"/>
-          </p:cNvSpPr>
-          <p:nvPr>
-            <p:ph type="title"/>
-          </p:nvPr>
-        </p:nvSpPr>
-        <p:spPr>
-          <a:xfrm>
-            <a:off x="457200" y="152400"/>
-            <a:ext cx="8229600" cy="1251062"/>
+            <a:off x="3124200" y="6416675"/>
+            <a:ext cx="2895600" cy="365125"/>
           </a:xfrm>
           <a:prstGeom prst="rect">
             <a:avLst/>
           </a:prstGeom>
         </p:spPr>
         <p:txBody>
-          <a:bodyPr vert="horz" lIns="91440" rIns="45720" rtlCol="0" anchor="ctr">
-            <a:normAutofit/>
-            <a:scene3d>
-              <a:camera prst="orthographicFront"/>
-              <a:lightRig rig="threePt" dir="t">
-                <a:rot lat="0" lon="0" rev="4800000"/>
-              </a:lightRig>
-            </a:scene3d>
-            <a:sp3d prstMaterial="matte">
-              <a:bevelT w="50800" h="10160"/>
-            </a:sp3d>
-          </a:bodyPr>
+          <a:bodyPr vert="horz" anchor="b"/>
           <a:lstStyle>
-            <a:extLst/>
+            <a:lvl1pPr algn="ctr" eaLnBrk="1" latinLnBrk="0" hangingPunct="1">
+              <a:defRPr kumimoji="0" sz="1200">
+                <a:solidFill>
+                  <a:schemeClr val="tx1">
+                    <a:shade val="50000"/>
+                  </a:schemeClr>
+                </a:solidFill>
+              </a:defRPr>
+            </a:lvl1pPr>
           </a:lstStyle>
           <a:p>
-            <a:r>
-              <a:rPr kumimoji="0" lang="en-US" smtClean="0"/>
-              <a:t>Click to edit Master title style</a:t>
-            </a:r>
-            <a:endParaRPr kumimoji="0" lang="en-US"/>
-          </a:p>
-        </p:txBody>
-      </p:sp>
-      <p:sp>
-        <p:nvSpPr>
-          <p:cNvPr id="3" name="Text Placeholder 2"/>
-          <p:cNvSpPr>
-            <a:spLocks noGrp="1"/>
-          </p:cNvSpPr>
-          <p:nvPr>
-            <p:ph type="body" idx="1"/>
+            <a:endParaRPr lang="en-US"/>
+          </a:p>
+        </p:txBody>
+      </p:sp>
+      <p:sp>
+        <p:nvSpPr>
+          <p:cNvPr id="23" name="Slide Number Placeholder 22"/>
+          <p:cNvSpPr>
+            <a:spLocks noGrp="1"/>
+          </p:cNvSpPr>
+          <p:nvPr>
+            <p:ph type="sldNum" sz="quarter" idx="4"/>
           </p:nvPr>
         </p:nvSpPr>
         <p:spPr>
           <a:xfrm>
-            <a:off x="457200" y="1775191"/>
-            <a:ext cx="8229600" cy="4625609"/>
+            <a:off x="7924800" y="6416675"/>
+            <a:ext cx="762000" cy="365125"/>
           </a:xfrm>
           <a:prstGeom prst="rect">
             <a:avLst/>
           </a:prstGeom>
         </p:spPr>
         <p:txBody>
-          <a:bodyPr vert="horz" lIns="54864" tIns="91440" rtlCol="0">
-            <a:normAutofit/>
-          </a:bodyPr>
-          <a:lstStyle>
-            <a:extLst/>
-          </a:lstStyle>
-          <a:p>
-            <a:pPr lvl="0" eaLnBrk="1" latinLnBrk="0" hangingPunct="1"/>
-            <a:r>
-              <a:rPr kumimoji="0" lang="en-US" smtClean="0"/>
-              <a:t>Click to edit Master text styles</a:t>
-            </a:r>
-          </a:p>
-          <a:p>
-            <a:pPr lvl="1" eaLnBrk="1" latinLnBrk="0" hangingPunct="1"/>
-            <a:r>
-              <a:rPr kumimoji="0" lang="en-US" smtClean="0"/>
-              <a:t>Second level</a:t>
-            </a:r>
-          </a:p>
-          <a:p>
-            <a:pPr lvl="2" eaLnBrk="1" latinLnBrk="0" hangingPunct="1"/>
-            <a:r>
-              <a:rPr kumimoji="0" lang="en-US" smtClean="0"/>
-              <a:t>Third level</a:t>
-            </a:r>
-          </a:p>
-          <a:p>
-            <a:pPr lvl="3" eaLnBrk="1" latinLnBrk="0" hangingPunct="1"/>
-            <a:r>
-              <a:rPr kumimoji="0" lang="en-US" smtClean="0"/>
-              <a:t>Fourth level</a:t>
-            </a:r>
-          </a:p>
-          <a:p>
-            <a:pPr lvl="4" eaLnBrk="1" latinLnBrk="0" hangingPunct="1"/>
-            <a:r>
-              <a:rPr kumimoji="0" lang="en-US" smtClean="0"/>
-              <a:t>Fifth level</a:t>
-            </a:r>
-            <a:endParaRPr kumimoji="0" lang="en-US"/>
-          </a:p>
-        </p:txBody>
-      </p:sp>
-      <p:sp>
-        <p:nvSpPr>
-          <p:cNvPr id="4" name="Date Placeholder 3"/>
-          <p:cNvSpPr>
-            <a:spLocks noGrp="1"/>
-          </p:cNvSpPr>
-          <p:nvPr>
-            <p:ph type="dt" sz="half" idx="2"/>
-          </p:nvPr>
-        </p:nvSpPr>
-        <p:spPr>
-          <a:xfrm>
-            <a:off x="457200" y="6476999"/>
-            <a:ext cx="2133600" cy="274320"/>
-          </a:xfrm>
-          <a:prstGeom prst="rect">
-            <a:avLst/>
-          </a:prstGeom>
-        </p:spPr>
-        <p:txBody>
-          <a:bodyPr vert="horz" lIns="109728" rIns="45720" bIns="0" rtlCol="0" anchor="b"/>
-          <a:lstStyle>
-            <a:lvl1pPr algn="l" eaLnBrk="1" latinLnBrk="0" hangingPunct="1">
-              <a:defRPr kumimoji="0" sz="1200">
-                <a:solidFill>
-                  <a:schemeClr val="tx1">
-                    <a:tint val="95000"/>
-                  </a:schemeClr>
-                </a:solidFill>
-              </a:defRPr>
-            </a:lvl1pPr>
-            <a:extLst/>
-          </a:lstStyle>
-          <a:p>
-            <a:fld id="{2E894346-B744-48A0-AB61-643E2864BD5B}" type="datetimeFigureOut">
-              <a:rPr lang="en-US" smtClean="0"/>
-              <a:pPr/>
-              <a:t>10/21/2009</a:t>
-            </a:fld>
-            <a:endParaRPr lang="en-US"/>
-          </a:p>
-        </p:txBody>
-      </p:sp>
-      <p:sp>
-        <p:nvSpPr>
-          <p:cNvPr id="5" name="Footer Placeholder 4"/>
-          <p:cNvSpPr>
-            <a:spLocks noGrp="1"/>
-          </p:cNvSpPr>
-          <p:nvPr>
-            <p:ph type="ftr" sz="quarter" idx="3"/>
-          </p:nvPr>
-        </p:nvSpPr>
-        <p:spPr>
-          <a:xfrm>
-            <a:off x="2640596" y="6476999"/>
-            <a:ext cx="5507719" cy="274320"/>
-          </a:xfrm>
-          <a:prstGeom prst="rect">
-            <a:avLst/>
-          </a:prstGeom>
-        </p:spPr>
-        <p:txBody>
-          <a:bodyPr vert="horz" lIns="45720" rIns="45720" bIns="0" rtlCol="0" anchor="b"/>
-          <a:lstStyle>
-            <a:lvl1pPr algn="l" eaLnBrk="1" latinLnBrk="0" hangingPunct="1">
-              <a:defRPr kumimoji="0" sz="1200">
-                <a:solidFill>
-                  <a:schemeClr val="tx1">
-                    <a:tint val="95000"/>
-                  </a:schemeClr>
-                </a:solidFill>
-              </a:defRPr>
-            </a:lvl1pPr>
-            <a:extLst/>
-          </a:lstStyle>
-          <a:p>
-            <a:endParaRPr lang="en-US"/>
-          </a:p>
-        </p:txBody>
-      </p:sp>
-      <p:sp>
-        <p:nvSpPr>
-          <p:cNvPr id="6" name="Slide Number Placeholder 5"/>
-          <p:cNvSpPr>
-            <a:spLocks noGrp="1"/>
-          </p:cNvSpPr>
-          <p:nvPr>
-            <p:ph type="sldNum" sz="quarter" idx="4"/>
-          </p:nvPr>
-        </p:nvSpPr>
-        <p:spPr>
-          <a:xfrm>
-            <a:off x="8204396" y="6476999"/>
-            <a:ext cx="733864" cy="274320"/>
-          </a:xfrm>
-          <a:prstGeom prst="rect">
-            <a:avLst/>
-          </a:prstGeom>
-        </p:spPr>
-        <p:txBody>
-          <a:bodyPr vert="horz" bIns="0" rtlCol="0" anchor="b"/>
+          <a:bodyPr vert="horz" lIns="0" rIns="0" anchor="b"/>
           <a:lstStyle>
             <a:lvl1pPr algn="r" eaLnBrk="1" latinLnBrk="0" hangingPunct="1">
               <a:defRPr kumimoji="0" sz="1200">
                 <a:solidFill>
                   <a:schemeClr val="tx1">
-                    <a:tint val="95000"/>
+                    <a:shade val="50000"/>
                   </a:schemeClr>
                 </a:solidFill>
               </a:defRPr>
             </a:lvl1pPr>
-            <a:extLst/>
           </a:lstStyle>
           <a:p>
             <a:fld id="{E20792DC-04E7-413D-B463-DF2B337F2D3F}" type="slidenum">
@@ -4062,53 +3240,81 @@
       </p:sp>
     </p:spTree>
   </p:cSld>
-  <p:clrMap bg1="lt1" tx1="dk1" bg2="lt2" tx2="dk2" accent1="accent1" accent2="accent2" accent3="accent3" accent4="accent4" accent5="accent5" accent6="accent6" hlink="hlink" folHlink="folHlink"/>
+  <p:clrMap bg1="dk1" tx1="lt1" bg2="dk2" tx2="lt2" accent1="accent1" accent2="accent2" accent3="accent3" accent4="accent4" accent5="accent5" accent6="accent6" hlink="hlink" folHlink="folHlink"/>
   <p:sldLayoutIdLst>
-    <p:sldLayoutId id="2147483661" r:id="rId1"/>
-    <p:sldLayoutId id="2147483662" r:id="rId2"/>
-    <p:sldLayoutId id="2147483663" r:id="rId3"/>
-    <p:sldLayoutId id="2147483664" r:id="rId4"/>
-    <p:sldLayoutId id="2147483665" r:id="rId5"/>
-    <p:sldLayoutId id="2147483666" r:id="rId6"/>
-    <p:sldLayoutId id="2147483667" r:id="rId7"/>
-    <p:sldLayoutId id="2147483668" r:id="rId8"/>
-    <p:sldLayoutId id="2147483669" r:id="rId9"/>
-    <p:sldLayoutId id="2147483670" r:id="rId10"/>
-    <p:sldLayoutId id="2147483671" r:id="rId11"/>
+    <p:sldLayoutId id="2147483673" r:id="rId1"/>
+    <p:sldLayoutId id="2147483674" r:id="rId2"/>
+    <p:sldLayoutId id="2147483675" r:id="rId3"/>
+    <p:sldLayoutId id="2147483676" r:id="rId4"/>
+    <p:sldLayoutId id="2147483677" r:id="rId5"/>
+    <p:sldLayoutId id="2147483678" r:id="rId6"/>
+    <p:sldLayoutId id="2147483679" r:id="rId7"/>
+    <p:sldLayoutId id="2147483680" r:id="rId8"/>
+    <p:sldLayoutId id="2147483681" r:id="rId9"/>
+    <p:sldLayoutId id="2147483682" r:id="rId10"/>
+    <p:sldLayoutId id="2147483683" r:id="rId11"/>
   </p:sldLayoutIdLst>
   <p:txStyles>
     <p:titleStyle>
-      <a:lvl1pPr algn="l" rtl="0" eaLnBrk="1" latinLnBrk="0" hangingPunct="1">
+      <a:lvl1pPr algn="ctr" rtl="0" eaLnBrk="1" latinLnBrk="0" hangingPunct="1">
         <a:spcBef>
           <a:spcPct val="0"/>
         </a:spcBef>
         <a:buNone/>
-        <a:defRPr kumimoji="0" sz="4500" b="1" kern="1200">
-          <a:solidFill>
-            <a:schemeClr val="accent1">
-              <a:satMod val="150000"/>
-            </a:schemeClr>
-          </a:solidFill>
-          <a:effectLst/>
+        <a:defRPr kumimoji="0" sz="4100" b="1" kern="1200" cap="none" baseline="0">
+          <a:ln w="6350">
+            <a:noFill/>
+          </a:ln>
+          <a:gradFill>
+            <a:gsLst>
+              <a:gs pos="0">
+                <a:schemeClr val="accent1">
+                  <a:tint val="73000"/>
+                  <a:satMod val="145000"/>
+                </a:schemeClr>
+              </a:gs>
+              <a:gs pos="73000">
+                <a:schemeClr val="accent1">
+                  <a:tint val="73000"/>
+                  <a:satMod val="145000"/>
+                </a:schemeClr>
+              </a:gs>
+              <a:gs pos="100000">
+                <a:schemeClr val="accent1">
+                  <a:tint val="83000"/>
+                  <a:satMod val="143000"/>
+                </a:schemeClr>
+              </a:gs>
+            </a:gsLst>
+            <a:lin ang="4800000" scaled="1"/>
+          </a:gradFill>
+          <a:effectLst>
+            <a:outerShdw blurRad="114300" dist="101600" dir="2700000" algn="tl" rotWithShape="0">
+              <a:srgbClr val="000000">
+                <a:alpha val="40000"/>
+              </a:srgbClr>
+            </a:outerShdw>
+          </a:effectLst>
           <a:latin typeface="+mj-lt"/>
           <a:ea typeface="+mj-ea"/>
           <a:cs typeface="+mj-cs"/>
         </a:defRPr>
       </a:lvl1pPr>
-      <a:extLst/>
     </p:titleStyle>
     <p:bodyStyle>
-      <a:lvl1pPr marL="438912" indent="-320040" algn="l" rtl="0" eaLnBrk="1" latinLnBrk="0" hangingPunct="1">
+      <a:lvl1pPr marL="548640" indent="-411480" algn="l" rtl="0" eaLnBrk="1" latinLnBrk="0" hangingPunct="1">
         <a:spcBef>
-          <a:spcPts val="0"/>
+          <a:spcPct val="20000"/>
         </a:spcBef>
         <a:buClr>
-          <a:schemeClr val="accent1"/>
+          <a:schemeClr val="tx1">
+            <a:shade val="95000"/>
+          </a:schemeClr>
         </a:buClr>
-        <a:buSzPct val="80000"/>
+        <a:buSzPct val="65000"/>
         <a:buFont typeface="Wingdings 2"/>
-        <a:buChar char=""/>
-        <a:defRPr kumimoji="0" sz="3200" kern="1200">
+        <a:buChar char=""/>
+        <a:defRPr kumimoji="0" sz="2800" kern="1200">
           <a:solidFill>
             <a:schemeClr val="tx1"/>
           </a:solidFill>
@@ -4117,17 +3323,17 @@
           <a:cs typeface="+mn-cs"/>
         </a:defRPr>
       </a:lvl1pPr>
-      <a:lvl2pPr marL="731520" indent="-274320" algn="l" rtl="0" eaLnBrk="1" latinLnBrk="0" hangingPunct="1">
+      <a:lvl2pPr marL="868680" indent="-283464" algn="l" rtl="0" eaLnBrk="1" latinLnBrk="0" hangingPunct="1">
         <a:spcBef>
           <a:spcPct val="20000"/>
         </a:spcBef>
         <a:buClr>
-          <a:schemeClr val="accent2"/>
+          <a:schemeClr val="tx1"/>
         </a:buClr>
-        <a:buSzPct val="90000"/>
-        <a:buFont typeface="Wingdings"/>
-        <a:buChar char=""/>
-        <a:defRPr kumimoji="0" sz="2800" kern="1200">
+        <a:buSzPct val="80000"/>
+        <a:buFont typeface="Wingdings 2"/>
+        <a:buChar char=""/>
+        <a:defRPr kumimoji="0" sz="2400" kern="1200">
           <a:solidFill>
             <a:schemeClr val="tx1"/>
           </a:solidFill>
@@ -4136,16 +3342,17 @@
           <a:cs typeface="+mn-cs"/>
         </a:defRPr>
       </a:lvl2pPr>
-      <a:lvl3pPr marL="996696" indent="-228600" algn="l" rtl="0" eaLnBrk="1" latinLnBrk="0" hangingPunct="1">
+      <a:lvl3pPr marL="1133856" indent="-228600" algn="l" rtl="0" eaLnBrk="1" latinLnBrk="0" hangingPunct="1">
         <a:spcBef>
           <a:spcPct val="20000"/>
         </a:spcBef>
         <a:buClr>
-          <a:schemeClr val="accent3"/>
+          <a:schemeClr val="tx1"/>
         </a:buClr>
-        <a:buFont typeface="Arial"/>
-        <a:buChar char="▪"/>
-        <a:defRPr kumimoji="0" sz="2400" kern="1200">
+        <a:buSzPct val="95000"/>
+        <a:buFont typeface="Wingdings"/>
+        <a:buChar char=""/>
+        <a:defRPr kumimoji="0" sz="2200" kern="1200">
           <a:solidFill>
             <a:schemeClr val="tx1"/>
           </a:solidFill>
@@ -4154,15 +3361,16 @@
           <a:cs typeface="+mn-cs"/>
         </a:defRPr>
       </a:lvl3pPr>
-      <a:lvl4pPr marL="1216152" indent="-182880" algn="l" rtl="0" eaLnBrk="1" latinLnBrk="0" hangingPunct="1">
+      <a:lvl4pPr marL="1353312" indent="-182880" algn="l" rtl="0" eaLnBrk="1" latinLnBrk="0" hangingPunct="1">
         <a:spcBef>
           <a:spcPct val="20000"/>
         </a:spcBef>
         <a:buClr>
-          <a:schemeClr val="accent4"/>
+          <a:schemeClr val="tx1"/>
         </a:buClr>
-        <a:buFont typeface="Arial"/>
-        <a:buChar char="▪"/>
+        <a:buSzPct val="100000"/>
+        <a:buFont typeface="Wingdings 3"/>
+        <a:buChar char=""/>
         <a:defRPr kumimoji="0" sz="2000" kern="1200">
           <a:solidFill>
             <a:schemeClr val="tx1"/>
@@ -4172,16 +3380,16 @@
           <a:cs typeface="+mn-cs"/>
         </a:defRPr>
       </a:lvl4pPr>
-      <a:lvl5pPr marL="1426464" indent="-182880" algn="l" rtl="0" eaLnBrk="1" latinLnBrk="0" hangingPunct="1">
+      <a:lvl5pPr marL="1545336" indent="-182880" algn="l" rtl="0" eaLnBrk="1" latinLnBrk="0" hangingPunct="1">
         <a:spcBef>
           <a:spcPct val="20000"/>
         </a:spcBef>
         <a:buClr>
-          <a:schemeClr val="accent5"/>
+          <a:schemeClr val="tx1"/>
         </a:buClr>
-        <a:buFont typeface="Wingdings 3"/>
-        <a:buChar char=""/>
-        <a:defRPr kumimoji="0" lang="en-US" sz="2000" kern="1200" smtClean="0">
+        <a:buFont typeface="Wingdings 2"/>
+        <a:buChar char=""/>
+        <a:defRPr kumimoji="0" sz="2000" kern="1200">
           <a:solidFill>
             <a:schemeClr val="tx1"/>
           </a:solidFill>
@@ -4190,17 +3398,16 @@
           <a:cs typeface="+mn-cs"/>
         </a:defRPr>
       </a:lvl5pPr>
-      <a:lvl6pPr marL="1627632" indent="-182880" algn="l" rtl="0" eaLnBrk="1" latinLnBrk="0" hangingPunct="1">
+      <a:lvl6pPr marL="1764792" indent="-182880" algn="l" rtl="0" eaLnBrk="1" latinLnBrk="0" hangingPunct="1">
         <a:spcBef>
           <a:spcPct val="20000"/>
         </a:spcBef>
         <a:buClr>
-          <a:schemeClr val="accent6"/>
+          <a:schemeClr val="tx1"/>
         </a:buClr>
-        <a:buSzPct val="100000"/>
-        <a:buFont typeface="Wingdings 2"/>
-        <a:buChar char=""/>
-        <a:defRPr kumimoji="0" sz="2000" kern="1200">
+        <a:buFont typeface="Wingdings 3"/>
+        <a:buChar char=""/>
+        <a:defRPr kumimoji="0" sz="1800" kern="1200">
           <a:solidFill>
             <a:schemeClr val="tx1"/>
           </a:solidFill>
@@ -4209,17 +3416,16 @@
           <a:cs typeface="+mn-cs"/>
         </a:defRPr>
       </a:lvl6pPr>
-      <a:lvl7pPr marL="1828800" indent="-182880" algn="l" rtl="0" eaLnBrk="1" latinLnBrk="0" hangingPunct="1">
+      <a:lvl7pPr marL="1965960" indent="-182880" algn="l" rtl="0" eaLnBrk="1" latinLnBrk="0" hangingPunct="1">
         <a:spcBef>
           <a:spcPct val="20000"/>
         </a:spcBef>
         <a:buClr>
-          <a:schemeClr val="accent1"/>
+          <a:schemeClr val="tx1"/>
         </a:buClr>
-        <a:buSzPct val="100000"/>
         <a:buFont typeface="Wingdings 2"/>
         <a:buChar char=""/>
-        <a:defRPr kumimoji="0" sz="1800" kern="1200">
+        <a:defRPr kumimoji="0" sz="1600" kern="1200">
           <a:solidFill>
             <a:schemeClr val="tx1"/>
           </a:solidFill>
@@ -4228,16 +3434,16 @@
           <a:cs typeface="+mn-cs"/>
         </a:defRPr>
       </a:lvl7pPr>
-      <a:lvl8pPr marL="2029968" indent="-182880" algn="l" rtl="0" eaLnBrk="1" latinLnBrk="0" hangingPunct="1">
+      <a:lvl8pPr marL="2167128" indent="-182880" algn="l" rtl="0" eaLnBrk="1" latinLnBrk="0" hangingPunct="1">
         <a:spcBef>
           <a:spcPct val="20000"/>
         </a:spcBef>
         <a:buClr>
-          <a:schemeClr val="accent2"/>
+          <a:schemeClr val="tx1"/>
         </a:buClr>
-        <a:buFont typeface="Wingdings 2" pitchFamily="18" charset="2"/>
+        <a:buFont typeface="Wingdings 2"/>
         <a:buChar char=""/>
-        <a:defRPr kumimoji="0" sz="1800" kern="1200">
+        <a:defRPr kumimoji="0" sz="1400" kern="1200">
           <a:solidFill>
             <a:schemeClr val="tx1"/>
           </a:solidFill>
@@ -4246,16 +3452,16 @@
           <a:cs typeface="+mn-cs"/>
         </a:defRPr>
       </a:lvl8pPr>
-      <a:lvl9pPr marL="2231136" indent="-182880" algn="l" rtl="0" eaLnBrk="1" latinLnBrk="0" hangingPunct="1">
+      <a:lvl9pPr marL="2368296" indent="-182880" algn="l" rtl="0" eaLnBrk="1" latinLnBrk="0" hangingPunct="1">
         <a:spcBef>
           <a:spcPct val="20000"/>
         </a:spcBef>
         <a:buClr>
-          <a:schemeClr val="accent3"/>
+          <a:schemeClr val="tx1"/>
         </a:buClr>
-        <a:buFont typeface="Wingdings 2" pitchFamily="18" charset="2"/>
+        <a:buFont typeface="Wingdings 2"/>
         <a:buChar char=""/>
-        <a:defRPr kumimoji="0" sz="1800" kern="1200" baseline="0">
+        <a:defRPr kumimoji="0" sz="1400" kern="1200" baseline="0">
           <a:solidFill>
             <a:schemeClr val="tx1"/>
           </a:solidFill>
@@ -4264,7 +3470,6 @@
           <a:cs typeface="+mn-cs"/>
         </a:defRPr>
       </a:lvl9pPr>
-      <a:extLst/>
     </p:bodyStyle>
     <p:otherStyle>
       <a:lvl1pPr marL="0" algn="l" rtl="0" eaLnBrk="1" latinLnBrk="0" hangingPunct="1">
@@ -4357,7 +3562,6 @@
           <a:cs typeface="+mn-cs"/>
         </a:defRPr>
       </a:lvl9pPr>
-      <a:extLst/>
     </p:otherStyle>
   </p:txStyles>
 </p:sldMaster>
@@ -4366,6 +3570,14 @@
 <file path=ppt/slides/slide1.xml><?xml version="1.0" encoding="utf-8"?>
 <p:sld xmlns:a="http://schemas.openxmlformats.org/drawingml/2006/main" xmlns:r="http://schemas.openxmlformats.org/officeDocument/2006/relationships" xmlns:p="http://schemas.openxmlformats.org/presentationml/2006/main">
   <p:cSld>
+    <p:bg>
+      <p:bgPr>
+        <a:solidFill>
+          <a:schemeClr val="bg1"/>
+        </a:solidFill>
+        <a:effectLst/>
+      </p:bgPr>
+    </p:bg>
     <p:spTree>
       <p:nvGrpSpPr>
         <p:cNvPr id="1" name=""/>
@@ -4396,10 +3608,22 @@
           <a:lstStyle/>
           <a:p>
             <a:r>
-              <a:rPr lang="en-US" dirty="0" smtClean="0"/>
+              <a:rPr lang="en-US" sz="4400" dirty="0" smtClean="0">
+                <a:solidFill>
+                  <a:schemeClr val="tx1"/>
+                </a:solidFill>
+                <a:latin typeface="Calibri"/>
+                <a:cs typeface="Calibri"/>
+              </a:rPr>
               <a:t>title</a:t>
             </a:r>
-            <a:endParaRPr lang="en-US" dirty="0"/>
+            <a:endParaRPr lang="en-US" sz="4400" dirty="0">
+              <a:solidFill>
+                <a:schemeClr val="tx1"/>
+              </a:solidFill>
+              <a:latin typeface="Calibri"/>
+              <a:cs typeface="Calibri"/>
+            </a:endParaRPr>
           </a:p>
         </p:txBody>
       </p:sp>
@@ -4419,10 +3643,16 @@
           <a:lstStyle/>
           <a:p>
             <a:r>
-              <a:rPr lang="en-US" dirty="0" smtClean="0"/>
+              <a:rPr lang="en-US" dirty="0" smtClean="0">
+                <a:latin typeface="Calibri"/>
+                <a:cs typeface="Calibri"/>
+              </a:rPr>
               <a:t>description</a:t>
             </a:r>
-            <a:endParaRPr lang="en-US" dirty="0"/>
+            <a:endParaRPr lang="en-US" dirty="0">
+              <a:latin typeface="Calibri"/>
+              <a:cs typeface="Calibri"/>
+            </a:endParaRPr>
           </a:p>
         </p:txBody>
       </p:sp>
@@ -4437,6 +3667,14 @@
 <file path=ppt/slides/slide2.xml><?xml version="1.0" encoding="utf-8"?>
 <p:sld xmlns:a="http://schemas.openxmlformats.org/drawingml/2006/main" xmlns:r="http://schemas.openxmlformats.org/officeDocument/2006/relationships" xmlns:p="http://schemas.openxmlformats.org/presentationml/2006/main">
   <p:cSld>
+    <p:bg>
+      <p:bgPr>
+        <a:solidFill>
+          <a:schemeClr val="bg1"/>
+        </a:solidFill>
+        <a:effectLst/>
+      </p:bgPr>
+    </p:bg>
     <p:spTree>
       <p:nvGrpSpPr>
         <p:cNvPr id="1" name=""/>
@@ -4463,14 +3701,30 @@
         </p:nvSpPr>
         <p:spPr/>
         <p:txBody>
-          <a:bodyPr/>
-          <a:lstStyle/>
-          <a:p>
-            <a:r>
-              <a:rPr lang="en-US" dirty="0" smtClean="0"/>
+          <a:bodyPr>
+            <a:normAutofit/>
+          </a:bodyPr>
+          <a:lstStyle/>
+          <a:p>
+            <a:r>
+              <a:rPr lang="en-US" sz="4400" dirty="0" smtClean="0">
+                <a:solidFill>
+                  <a:srgbClr val="FFFFFF"/>
+                </a:solidFill>
+                <a:effectLst/>
+                <a:latin typeface="Calibri"/>
+                <a:cs typeface="Calibri"/>
+              </a:rPr>
               <a:t>title</a:t>
             </a:r>
-            <a:endParaRPr lang="en-US" dirty="0"/>
+            <a:endParaRPr lang="en-US" sz="4400" dirty="0">
+              <a:solidFill>
+                <a:srgbClr val="FFFFFF"/>
+              </a:solidFill>
+              <a:effectLst/>
+              <a:latin typeface="Calibri"/>
+              <a:cs typeface="Calibri"/>
+            </a:endParaRPr>
           </a:p>
         </p:txBody>
       </p:sp>
@@ -4485,7 +3739,7 @@
           </p:nvPr>
         </p:nvPicPr>
         <p:blipFill>
-          <a:blip r:embed="rId3"/>
+          <a:blip r:embed="rId3" cstate="print"/>
           <a:stretch>
             <a:fillRect/>
           </a:stretch>
@@ -4506,9 +3760,9 @@
 </file>
 
 <file path=ppt/theme/theme1.xml><?xml version="1.0" encoding="utf-8"?>
-<a:theme xmlns:a="http://schemas.openxmlformats.org/drawingml/2006/main" name="Module">
+<a:theme xmlns:a="http://schemas.openxmlformats.org/drawingml/2006/main" name="Apex">
   <a:themeElements>
-    <a:clrScheme name="Module">
+    <a:clrScheme name="Apex">
       <a:dk1>
         <a:sysClr val="windowText" lastClr="000000"/>
       </a:dk1>
@@ -4516,48 +3770,50 @@
         <a:sysClr val="window" lastClr="FFFFFF"/>
       </a:lt1>
       <a:dk2>
-        <a:srgbClr val="5A6378"/>
+        <a:srgbClr val="69676D"/>
       </a:dk2>
       <a:lt2>
-        <a:srgbClr val="D4D4D6"/>
+        <a:srgbClr val="C9C2D1"/>
       </a:lt2>
       <a:accent1>
-        <a:srgbClr val="F0AD00"/>
+        <a:srgbClr val="CEB966"/>
       </a:accent1>
       <a:accent2>
-        <a:srgbClr val="60B5CC"/>
+        <a:srgbClr val="9CB084"/>
       </a:accent2>
       <a:accent3>
-        <a:srgbClr val="E66C7D"/>
+        <a:srgbClr val="6BB1C9"/>
       </a:accent3>
       <a:accent4>
-        <a:srgbClr val="6BB76D"/>
+        <a:srgbClr val="6585CF"/>
       </a:accent4>
       <a:accent5>
-        <a:srgbClr val="E88651"/>
+        <a:srgbClr val="7E6BC9"/>
       </a:accent5>
       <a:accent6>
-        <a:srgbClr val="C64847"/>
+        <a:srgbClr val="A379BB"/>
       </a:accent6>
       <a:hlink>
-        <a:srgbClr val="168BBA"/>
+        <a:srgbClr val="410082"/>
       </a:hlink>
       <a:folHlink>
-        <a:srgbClr val="680000"/>
+        <a:srgbClr val="932968"/>
       </a:folHlink>
     </a:clrScheme>
-    <a:fontScheme name="Module">
+    <a:fontScheme name="Apex">
       <a:majorFont>
-        <a:latin typeface="Corbel"/>
+        <a:latin typeface="Lucida Sans"/>
         <a:ea typeface=""/>
         <a:cs typeface=""/>
-        <a:font script="Jpan" typeface="HGｺﾞｼｯｸM"/>
-        <a:font script="Hang" typeface="HY엽서L"/>
-        <a:font script="Hans" typeface="华文楷体"/>
-        <a:font script="Hant" typeface="新細明體"/>
+        <a:font script="Grek" typeface="Arial"/>
+        <a:font script="Cyrl" typeface="Arial"/>
+        <a:font script="Jpan" typeface="HG丸ｺﾞｼｯｸM-PRO"/>
+        <a:font script="Hang" typeface="휴먼옛체"/>
+        <a:font script="Hans" typeface="黑体"/>
+        <a:font script="Hant" typeface="微軟正黑體"/>
         <a:font script="Arab" typeface="Tahoma"/>
-        <a:font script="Hebr" typeface="Miriam"/>
-        <a:font script="Thai" typeface="DilleniaUPC"/>
+        <a:font script="Hebr" typeface="Levenim MT"/>
+        <a:font script="Thai" typeface="FreesiaUPC"/>
         <a:font script="Ethi" typeface="Nyala"/>
         <a:font script="Beng" typeface="Vrinda"/>
         <a:font script="Gujr" typeface="Shruti"/>
@@ -4578,24 +3834,26 @@
         <a:font script="Laoo" typeface="DokChampa"/>
         <a:font script="Sinh" typeface="Iskoola Pota"/>
         <a:font script="Mong" typeface="Mongolian Baiti"/>
-        <a:font script="Viet" typeface="Arial"/>
+        <a:font script="Viet" typeface="Tahoma"/>
         <a:font script="Uigh" typeface="Microsoft Uighur"/>
       </a:majorFont>
       <a:minorFont>
-        <a:latin typeface="Corbel"/>
+        <a:latin typeface="Book Antiqua"/>
         <a:ea typeface=""/>
         <a:cs typeface=""/>
-        <a:font script="Jpan" typeface="HGｺﾞｼｯｸM"/>
-        <a:font script="Hang" typeface="HY엽서L"/>
-        <a:font script="Hans" typeface="华文楷体"/>
+        <a:font script="Grek" typeface="Times New Roman"/>
+        <a:font script="Cyrl" typeface="Times New Roman"/>
+        <a:font script="Jpan" typeface="HG明朝B"/>
+        <a:font script="Hang" typeface="돋움"/>
+        <a:font script="Hans" typeface="宋体"/>
         <a:font script="Hant" typeface="新細明體"/>
-        <a:font script="Arab" typeface="Tahoma"/>
-        <a:font script="Hebr" typeface="Miriam"/>
-        <a:font script="Thai" typeface="DilleniaUPC"/>
+        <a:font script="Arab" typeface="Times New Roman"/>
+        <a:font script="Hebr" typeface="David"/>
+        <a:font script="Thai" typeface="EucrosiaUPC"/>
         <a:font script="Ethi" typeface="Nyala"/>
         <a:font script="Beng" typeface="Vrinda"/>
         <a:font script="Gujr" typeface="Shruti"/>
-        <a:font script="Khmr" typeface="DaunPenh"/>
+        <a:font script="Khmr" typeface="MoolBoran"/>
         <a:font script="Knda" typeface="Tunga"/>
         <a:font script="Guru" typeface="Raavi"/>
         <a:font script="Cans" typeface="Euphemia"/>
@@ -4612,79 +3870,88 @@
         <a:font script="Laoo" typeface="DokChampa"/>
         <a:font script="Sinh" typeface="Iskoola Pota"/>
         <a:font script="Mong" typeface="Mongolian Baiti"/>
-        <a:font script="Viet" typeface="Arial"/>
+        <a:font script="Viet" typeface="Times New Roman"/>
         <a:font script="Uigh" typeface="Microsoft Uighur"/>
       </a:minorFont>
     </a:fontScheme>
-    <a:fmtScheme name="Module">
+    <a:fmtScheme name="Apex">
       <a:fillStyleLst>
         <a:solidFill>
           <a:schemeClr val="phClr"/>
         </a:solidFill>
         <a:gradFill rotWithShape="1">
           <a:gsLst>
-            <a:gs pos="0">
+            <a:gs pos="20000">
               <a:schemeClr val="phClr">
-                <a:tint val="50000"/>
-                <a:satMod val="300000"/>
-              </a:schemeClr>
-            </a:gs>
-            <a:gs pos="35000">
-              <a:schemeClr val="phClr">
-                <a:tint val="37000"/>
-                <a:satMod val="300000"/>
+                <a:tint val="9000"/>
               </a:schemeClr>
             </a:gs>
             <a:gs pos="100000">
               <a:schemeClr val="phClr">
-                <a:tint val="15000"/>
-                <a:satMod val="350000"/>
+                <a:tint val="70000"/>
+                <a:satMod val="100000"/>
               </a:schemeClr>
             </a:gs>
           </a:gsLst>
-          <a:lin ang="16200000" scaled="1"/>
+          <a:path path="circle">
+            <a:fillToRect l="-15000" t="-15000" r="115000" b="115000"/>
+          </a:path>
         </a:gradFill>
         <a:gradFill rotWithShape="1">
           <a:gsLst>
             <a:gs pos="0">
               <a:schemeClr val="phClr">
-                <a:shade val="47500"/>
-                <a:satMod val="137000"/>
+                <a:shade val="60000"/>
               </a:schemeClr>
             </a:gs>
-            <a:gs pos="55000">
+            <a:gs pos="33000">
               <a:schemeClr val="phClr">
-                <a:shade val="69000"/>
-                <a:satMod val="137000"/>
+                <a:tint val="86500"/>
+              </a:schemeClr>
+            </a:gs>
+            <a:gs pos="46750">
+              <a:schemeClr val="phClr">
+                <a:tint val="71000"/>
+                <a:satMod val="112000"/>
+              </a:schemeClr>
+            </a:gs>
+            <a:gs pos="53000">
+              <a:schemeClr val="phClr">
+                <a:tint val="71000"/>
+                <a:satMod val="112000"/>
+              </a:schemeClr>
+            </a:gs>
+            <a:gs pos="68000">
+              <a:schemeClr val="phClr">
+                <a:tint val="86000"/>
               </a:schemeClr>
             </a:gs>
             <a:gs pos="100000">
               <a:schemeClr val="phClr">
-                <a:shade val="98000"/>
-                <a:satMod val="137000"/>
+                <a:shade val="60000"/>
               </a:schemeClr>
             </a:gs>
           </a:gsLst>
-          <a:lin ang="16200000" scaled="0"/>
+          <a:lin ang="8350000" scaled="1"/>
         </a:gradFill>
       </a:fillStyleLst>
       <a:lnStyleLst>
-        <a:ln w="6350" cap="rnd" cmpd="sng" algn="ctr">
+        <a:ln w="9525" cap="flat" cmpd="sng" algn="ctr">
           <a:solidFill>
             <a:schemeClr val="phClr">
-              <a:shade val="95000"/>
-              <a:satMod val="105000"/>
+              <a:shade val="48000"/>
+              <a:satMod val="110000"/>
             </a:schemeClr>
           </a:solidFill>
           <a:prstDash val="solid"/>
         </a:ln>
-        <a:ln w="48000" cap="flat" cmpd="thickThin" algn="ctr">
+        <a:ln w="25400" cap="flat" cmpd="sng" algn="ctr">
           <a:solidFill>
             <a:schemeClr val="phClr"/>
           </a:solidFill>
           <a:prstDash val="solid"/>
         </a:ln>
-        <a:ln w="48500" cap="flat" cmpd="thickThin" algn="ctr">
+        <a:ln w="38100" cap="flat" cmpd="sng" algn="ctr">
           <a:solidFill>
             <a:schemeClr val="phClr"/>
           </a:solidFill>
@@ -4694,27 +3961,27 @@
       <a:effectStyleLst>
         <a:effectStyle>
           <a:effectLst>
-            <a:outerShdw blurRad="45000" dist="25000" dir="5400000" rotWithShape="0">
+            <a:outerShdw blurRad="130000" dist="101600" dir="2700000" algn="tl" rotWithShape="0">
               <a:srgbClr val="000000">
-                <a:alpha val="38000"/>
+                <a:alpha val="35000"/>
               </a:srgbClr>
             </a:outerShdw>
           </a:effectLst>
         </a:effectStyle>
         <a:effectStyle>
           <a:effectLst>
-            <a:outerShdw blurRad="39000" dist="25400" dir="5400000" rotWithShape="0">
+            <a:outerShdw blurRad="190500" dist="228600" dir="2700000" sy="90000" rotWithShape="0">
               <a:srgbClr val="000000">
-                <a:alpha val="38000"/>
+                <a:alpha val="25500"/>
               </a:srgbClr>
             </a:outerShdw>
           </a:effectLst>
         </a:effectStyle>
         <a:effectStyle>
           <a:effectLst>
-            <a:outerShdw blurRad="39000" dist="25400" dir="5400000" rotWithShape="0">
+            <a:outerShdw blurRad="190500" dist="228600" dir="2700000" sy="90000" rotWithShape="0">
               <a:srgbClr val="000000">
-                <a:alpha val="38000"/>
+                <a:alpha val="25500"/>
               </a:srgbClr>
             </a:outerShdw>
           </a:effectLst>
@@ -4722,12 +3989,12 @@
             <a:camera prst="orthographicFront" fov="0">
               <a:rot lat="0" lon="0" rev="0"/>
             </a:camera>
-            <a:lightRig rig="threePt" dir="t">
-              <a:rot lat="0" lon="0" rev="1800000"/>
+            <a:lightRig rig="soft" dir="tl">
+              <a:rot lat="0" lon="0" rev="20100000"/>
             </a:lightRig>
           </a:scene3d>
-          <a:sp3d prstMaterial="matte">
-            <a:bevelT h="20000"/>
+          <a:sp3d>
+            <a:bevelT w="50800" h="50800"/>
           </a:sp3d>
         </a:effectStyle>
       </a:effectStyleLst>
@@ -4739,46 +4006,37 @@
           <a:gsLst>
             <a:gs pos="0">
               <a:schemeClr val="phClr">
-                <a:tint val="48000"/>
-                <a:satMod val="300000"/>
-              </a:schemeClr>
-            </a:gs>
-            <a:gs pos="12000">
-              <a:schemeClr val="phClr">
-                <a:tint val="48000"/>
-                <a:satMod val="300000"/>
-              </a:schemeClr>
-            </a:gs>
-            <a:gs pos="20000">
-              <a:schemeClr val="phClr">
-                <a:tint val="49000"/>
-                <a:satMod val="300000"/>
+                <a:tint val="50000"/>
+                <a:satMod val="180000"/>
               </a:schemeClr>
             </a:gs>
             <a:gs pos="100000">
               <a:schemeClr val="phClr">
-                <a:shade val="30000"/>
+                <a:shade val="45000"/>
+                <a:satMod val="120000"/>
               </a:schemeClr>
             </a:gs>
           </a:gsLst>
           <a:path path="circle">
-            <a:fillToRect l="10000" t="-25000" r="10000" b="125000"/>
+            <a:fillToRect r="100000" b="100000"/>
           </a:path>
         </a:gradFill>
         <a:blipFill>
           <a:blip xmlns:r="http://schemas.openxmlformats.org/officeDocument/2006/relationships" r:embed="rId1">
             <a:duotone>
               <a:schemeClr val="phClr">
-                <a:shade val="75000"/>
-                <a:satMod val="105000"/>
+                <a:shade val="3000"/>
+                <a:satMod val="110000"/>
               </a:schemeClr>
               <a:schemeClr val="phClr">
-                <a:tint val="95000"/>
-                <a:satMod val="105000"/>
+                <a:tint val="60000"/>
+                <a:satMod val="425000"/>
               </a:schemeClr>
             </a:duotone>
           </a:blip>
-          <a:tile tx="0" ty="0" sx="38000" sy="38000" flip="none" algn="tl"/>
+          <a:stretch>
+            <a:fillRect/>
+          </a:stretch>
         </a:blipFill>
       </a:bgFillStyleLst>
     </a:fmtScheme>

</xml_diff>